<commit_message>
[20161122] Github Pt Update
</commit_message>
<xml_diff>
--- a/simpsons.pptx
+++ b/simpsons.pptx
@@ -3199,7 +3199,7 @@
         </p:nvSpPr>
         <p:spPr>
           <a:xfrm>
-            <a:off x="5951765" y="2422795"/>
+            <a:off x="6236578" y="2406258"/>
             <a:ext cx="4675414" cy="769441"/>
           </a:xfrm>
           <a:prstGeom prst="rect">
@@ -3245,8 +3245,8 @@
         </p:nvSpPr>
         <p:spPr>
           <a:xfrm>
-            <a:off x="6713765" y="3244920"/>
-            <a:ext cx="3151414" cy="461665"/>
+            <a:off x="8471698" y="3175699"/>
+            <a:ext cx="2460215" cy="461665"/>
           </a:xfrm>
           <a:prstGeom prst="rect">
             <a:avLst/>
@@ -3408,8 +3408,8 @@
         </p:nvSpPr>
         <p:spPr>
           <a:xfrm>
-            <a:off x="859972" y="664029"/>
-            <a:ext cx="2209800" cy="769441"/>
+            <a:off x="0" y="2988215"/>
+            <a:ext cx="12191999" cy="1015663"/>
           </a:xfrm>
           <a:prstGeom prst="rect">
             <a:avLst/>
@@ -3422,13 +3422,52 @@
           </a:bodyPr>
           <a:lstStyle/>
           <a:p>
-            <a:r>
-              <a:rPr kumimoji="1" lang="en-US" altLang="ko-KR" sz="4400" b="1" smtClean="0">
+            <a:pPr algn="ctr"/>
+            <a:r>
+              <a:rPr kumimoji="1" lang="en-US" altLang="ko-KR" sz="6000" b="1" dirty="0" err="1" smtClean="0">
                 <a:solidFill>
                   <a:schemeClr val="accent2"/>
                 </a:solidFill>
               </a:rPr>
               <a:t>Github</a:t>
+            </a:r>
+            <a:endParaRPr kumimoji="1" lang="ko-KR" altLang="en-US" sz="4400" b="1" dirty="0">
+              <a:solidFill>
+                <a:schemeClr val="accent2"/>
+              </a:solidFill>
+            </a:endParaRPr>
+          </a:p>
+        </p:txBody>
+      </p:sp>
+      <p:sp>
+        <p:nvSpPr>
+          <p:cNvPr id="7" name="텍스트 상자 4"/>
+          <p:cNvSpPr txBox="1"/>
+          <p:nvPr/>
+        </p:nvSpPr>
+        <p:spPr>
+          <a:xfrm>
+            <a:off x="674914" y="598715"/>
+            <a:ext cx="4158343" cy="769441"/>
+          </a:xfrm>
+          <a:prstGeom prst="rect">
+            <a:avLst/>
+          </a:prstGeom>
+          <a:noFill/>
+        </p:spPr>
+        <p:txBody>
+          <a:bodyPr wrap="square" rtlCol="0">
+            <a:spAutoFit/>
+          </a:bodyPr>
+          <a:lstStyle/>
+          <a:p>
+            <a:r>
+              <a:rPr kumimoji="1" lang="en-US" altLang="ko-KR" sz="4400" b="1" dirty="0" smtClean="0">
+                <a:solidFill>
+                  <a:schemeClr val="accent2"/>
+                </a:solidFill>
+              </a:rPr>
+              <a:t>Serious</a:t>
             </a:r>
             <a:endParaRPr kumimoji="1" lang="ko-KR" altLang="en-US" sz="4400" b="1" dirty="0">
               <a:solidFill>
@@ -3461,6 +3500,14 @@
 <file path=ppt/slides/slide11.xml><?xml version="1.0" encoding="utf-8"?>
 <p:sld xmlns:a="http://schemas.openxmlformats.org/drawingml/2006/main" xmlns:r="http://schemas.openxmlformats.org/officeDocument/2006/relationships" xmlns:p="http://schemas.openxmlformats.org/presentationml/2006/main">
   <p:cSld>
+    <p:bg>
+      <p:bgPr>
+        <a:solidFill>
+          <a:srgbClr val="4C4C4C"/>
+        </a:solidFill>
+        <a:effectLst/>
+      </p:bgPr>
+    </p:bg>
     <p:spTree>
       <p:nvGrpSpPr>
         <p:cNvPr id="1" name=""/>
@@ -3477,64 +3524,14 @@
       </p:grpSpPr>
       <p:sp>
         <p:nvSpPr>
-          <p:cNvPr id="4" name="직사각형 3"/>
-          <p:cNvSpPr/>
-          <p:nvPr/>
-        </p:nvSpPr>
-        <p:spPr>
-          <a:xfrm>
-            <a:off x="0" y="-3"/>
-            <a:ext cx="12192001" cy="6858003"/>
-          </a:xfrm>
-          <a:prstGeom prst="rect">
-            <a:avLst/>
-          </a:prstGeom>
-          <a:solidFill>
-            <a:schemeClr val="tx1">
-              <a:alpha val="70000"/>
-            </a:schemeClr>
-          </a:solidFill>
-          <a:ln>
-            <a:solidFill>
-              <a:schemeClr val="tx1"/>
-            </a:solidFill>
-          </a:ln>
-        </p:spPr>
-        <p:style>
-          <a:lnRef idx="2">
-            <a:schemeClr val="accent1">
-              <a:shade val="50000"/>
-            </a:schemeClr>
-          </a:lnRef>
-          <a:fillRef idx="1">
-            <a:schemeClr val="accent1"/>
-          </a:fillRef>
-          <a:effectRef idx="0">
-            <a:schemeClr val="accent1"/>
-          </a:effectRef>
-          <a:fontRef idx="minor">
-            <a:schemeClr val="lt1"/>
-          </a:fontRef>
-        </p:style>
-        <p:txBody>
-          <a:bodyPr rtlCol="0" anchor="ctr"/>
-          <a:lstStyle/>
-          <a:p>
-            <a:pPr algn="ctr"/>
-            <a:endParaRPr lang="ko-KR" altLang="en-US" dirty="0"/>
-          </a:p>
-        </p:txBody>
-      </p:sp>
-      <p:sp>
-        <p:nvSpPr>
           <p:cNvPr id="5" name="텍스트 상자 4"/>
           <p:cNvSpPr txBox="1"/>
           <p:nvPr/>
         </p:nvSpPr>
         <p:spPr>
           <a:xfrm>
-            <a:off x="859972" y="664029"/>
-            <a:ext cx="2209800" cy="769441"/>
+            <a:off x="859971" y="664029"/>
+            <a:ext cx="4148127" cy="769441"/>
           </a:xfrm>
           <a:prstGeom prst="rect">
             <a:avLst/>
@@ -3548,12 +3545,20 @@
           <a:lstStyle/>
           <a:p>
             <a:r>
-              <a:rPr kumimoji="1" lang="en-US" altLang="ko-KR" sz="4400" b="1" smtClean="0">
+              <a:rPr kumimoji="1" lang="en-US" altLang="ko-KR" sz="4400" b="1" dirty="0" err="1" smtClean="0">
                 <a:solidFill>
                   <a:schemeClr val="accent2"/>
                 </a:solidFill>
               </a:rPr>
               <a:t>Github</a:t>
+            </a:r>
+            <a:r>
+              <a:rPr kumimoji="1" lang="en-US" altLang="ko-KR" sz="4400" b="1" dirty="0" smtClean="0">
+                <a:solidFill>
+                  <a:schemeClr val="accent2"/>
+                </a:solidFill>
+              </a:rPr>
+              <a:t> - Issue</a:t>
             </a:r>
             <a:endParaRPr kumimoji="1" lang="ko-KR" altLang="en-US" sz="4400" b="1" dirty="0">
               <a:solidFill>
@@ -3585,7 +3590,7 @@
         </p:blipFill>
         <p:spPr>
           <a:xfrm>
-            <a:off x="6264628" y="2932038"/>
+            <a:off x="3223697" y="1706650"/>
             <a:ext cx="5927372" cy="993919"/>
           </a:xfrm>
           <a:prstGeom prst="rect">
@@ -3615,52 +3620,14 @@
         </p:blipFill>
         <p:spPr>
           <a:xfrm>
-            <a:off x="610143" y="2188028"/>
-            <a:ext cx="5485857" cy="3145971"/>
+            <a:off x="3223697" y="2859819"/>
+            <a:ext cx="5927372" cy="3399166"/>
           </a:xfrm>
           <a:prstGeom prst="rect">
             <a:avLst/>
           </a:prstGeom>
         </p:spPr>
       </p:pic>
-      <p:sp>
-        <p:nvSpPr>
-          <p:cNvPr id="8" name="텍스트 상자 7"/>
-          <p:cNvSpPr txBox="1"/>
-          <p:nvPr/>
-        </p:nvSpPr>
-        <p:spPr>
-          <a:xfrm>
-            <a:off x="4054828" y="990600"/>
-            <a:ext cx="2209800" cy="769441"/>
-          </a:xfrm>
-          <a:prstGeom prst="rect">
-            <a:avLst/>
-          </a:prstGeom>
-          <a:noFill/>
-        </p:spPr>
-        <p:txBody>
-          <a:bodyPr wrap="square" rtlCol="0">
-            <a:spAutoFit/>
-          </a:bodyPr>
-          <a:lstStyle/>
-          <a:p>
-            <a:r>
-              <a:rPr kumimoji="1" lang="en-US" altLang="ko-KR" sz="4400" b="1" dirty="0" smtClean="0">
-                <a:solidFill>
-                  <a:schemeClr val="accent2"/>
-                </a:solidFill>
-              </a:rPr>
-              <a:t>Issue</a:t>
-            </a:r>
-            <a:endParaRPr kumimoji="1" lang="ko-KR" altLang="en-US" sz="4400" b="1" dirty="0">
-              <a:solidFill>
-                <a:schemeClr val="accent2"/>
-              </a:solidFill>
-            </a:endParaRPr>
-          </a:p>
-        </p:txBody>
-      </p:sp>
     </p:spTree>
     <p:extLst>
       <p:ext uri="{BB962C8B-B14F-4D97-AF65-F5344CB8AC3E}">
@@ -3756,8 +3723,8 @@
         </p:nvSpPr>
         <p:spPr>
           <a:xfrm>
-            <a:off x="859972" y="664029"/>
-            <a:ext cx="2209800" cy="769441"/>
+            <a:off x="859971" y="664029"/>
+            <a:ext cx="5256015" cy="769441"/>
           </a:xfrm>
           <a:prstGeom prst="rect">
             <a:avLst/>
@@ -3778,43 +3745,13 @@
               </a:rPr>
               <a:t>Github</a:t>
             </a:r>
-            <a:endParaRPr kumimoji="1" lang="ko-KR" altLang="en-US" sz="4400" b="1" dirty="0">
-              <a:solidFill>
-                <a:schemeClr val="accent2"/>
-              </a:solidFill>
-            </a:endParaRPr>
-          </a:p>
-        </p:txBody>
-      </p:sp>
-      <p:sp>
-        <p:nvSpPr>
-          <p:cNvPr id="6" name="텍스트 상자 5"/>
-          <p:cNvSpPr txBox="1"/>
-          <p:nvPr/>
-        </p:nvSpPr>
-        <p:spPr>
-          <a:xfrm>
-            <a:off x="3167743" y="943616"/>
-            <a:ext cx="3200399" cy="769441"/>
-          </a:xfrm>
-          <a:prstGeom prst="rect">
-            <a:avLst/>
-          </a:prstGeom>
-          <a:noFill/>
-        </p:spPr>
-        <p:txBody>
-          <a:bodyPr wrap="square" rtlCol="0">
-            <a:spAutoFit/>
-          </a:bodyPr>
-          <a:lstStyle/>
-          <a:p>
             <a:r>
               <a:rPr kumimoji="1" lang="en-US" altLang="ko-KR" sz="4400" b="1" dirty="0" smtClean="0">
                 <a:solidFill>
                   <a:schemeClr val="accent2"/>
                 </a:solidFill>
               </a:rPr>
-              <a:t>README</a:t>
+              <a:t> -  README</a:t>
             </a:r>
             <a:endParaRPr kumimoji="1" lang="ko-KR" altLang="en-US" sz="4400" b="1" dirty="0">
               <a:solidFill>
@@ -3846,8 +3783,8 @@
         </p:blipFill>
         <p:spPr>
           <a:xfrm>
-            <a:off x="2275115" y="2482222"/>
-            <a:ext cx="6183086" cy="3864429"/>
+            <a:off x="1975312" y="1433470"/>
+            <a:ext cx="7978158" cy="4986349"/>
           </a:xfrm>
           <a:prstGeom prst="rect">
             <a:avLst/>
@@ -3877,6 +3814,14 @@
 <file path=ppt/slides/slide13.xml><?xml version="1.0" encoding="utf-8"?>
 <p:sld xmlns:a="http://schemas.openxmlformats.org/drawingml/2006/main" xmlns:r="http://schemas.openxmlformats.org/officeDocument/2006/relationships" xmlns:p="http://schemas.openxmlformats.org/presentationml/2006/main">
   <p:cSld>
+    <p:bg>
+      <p:bgPr>
+        <a:solidFill>
+          <a:srgbClr val="4C4C4C"/>
+        </a:solidFill>
+        <a:effectLst/>
+      </p:bgPr>
+    </p:bg>
     <p:spTree>
       <p:nvGrpSpPr>
         <p:cNvPr id="1" name=""/>
@@ -3893,56 +3838,6 @@
       </p:grpSpPr>
       <p:sp>
         <p:nvSpPr>
-          <p:cNvPr id="4" name="직사각형 3"/>
-          <p:cNvSpPr/>
-          <p:nvPr/>
-        </p:nvSpPr>
-        <p:spPr>
-          <a:xfrm>
-            <a:off x="0" y="-3"/>
-            <a:ext cx="12192001" cy="6858003"/>
-          </a:xfrm>
-          <a:prstGeom prst="rect">
-            <a:avLst/>
-          </a:prstGeom>
-          <a:solidFill>
-            <a:schemeClr val="tx1">
-              <a:alpha val="70000"/>
-            </a:schemeClr>
-          </a:solidFill>
-          <a:ln>
-            <a:solidFill>
-              <a:schemeClr val="tx1"/>
-            </a:solidFill>
-          </a:ln>
-        </p:spPr>
-        <p:style>
-          <a:lnRef idx="2">
-            <a:schemeClr val="accent1">
-              <a:shade val="50000"/>
-            </a:schemeClr>
-          </a:lnRef>
-          <a:fillRef idx="1">
-            <a:schemeClr val="accent1"/>
-          </a:fillRef>
-          <a:effectRef idx="0">
-            <a:schemeClr val="accent1"/>
-          </a:effectRef>
-          <a:fontRef idx="minor">
-            <a:schemeClr val="lt1"/>
-          </a:fontRef>
-        </p:style>
-        <p:txBody>
-          <a:bodyPr rtlCol="0" anchor="ctr"/>
-          <a:lstStyle/>
-          <a:p>
-            <a:pPr algn="ctr"/>
-            <a:endParaRPr lang="ko-KR" altLang="en-US" dirty="0"/>
-          </a:p>
-        </p:txBody>
-      </p:sp>
-      <p:sp>
-        <p:nvSpPr>
           <p:cNvPr id="5" name="텍스트 상자 4"/>
           <p:cNvSpPr txBox="1"/>
           <p:nvPr/>
@@ -3987,8 +3882,8 @@
         </p:nvSpPr>
         <p:spPr>
           <a:xfrm>
-            <a:off x="1382487" y="1847128"/>
-            <a:ext cx="4354286" cy="584775"/>
+            <a:off x="-2" y="1860252"/>
+            <a:ext cx="12192002" cy="707886"/>
           </a:xfrm>
           <a:prstGeom prst="rect">
             <a:avLst/>
@@ -4001,15 +3896,16 @@
           </a:bodyPr>
           <a:lstStyle/>
           <a:p>
-            <a:r>
-              <a:rPr kumimoji="1" lang="en-US" altLang="ko-KR" sz="3200" b="1" dirty="0" smtClean="0">
+            <a:pPr algn="ctr"/>
+            <a:r>
+              <a:rPr kumimoji="1" lang="en-US" altLang="ko-KR" sz="4000" b="1" dirty="0" smtClean="0">
                 <a:solidFill>
                   <a:schemeClr val="accent2"/>
                 </a:solidFill>
               </a:rPr>
               <a:t>Next Version</a:t>
             </a:r>
-            <a:endParaRPr kumimoji="1" lang="ko-KR" altLang="en-US" sz="3200" b="1" dirty="0">
+            <a:endParaRPr kumimoji="1" lang="ko-KR" altLang="en-US" sz="4000" b="1" dirty="0">
               <a:solidFill>
                 <a:schemeClr val="accent2"/>
               </a:solidFill>
@@ -4025,8 +3921,8 @@
         </p:nvSpPr>
         <p:spPr>
           <a:xfrm>
-            <a:off x="5407842" y="2830696"/>
-            <a:ext cx="1850571" cy="523220"/>
+            <a:off x="-2" y="3768120"/>
+            <a:ext cx="12192002" cy="646331"/>
           </a:xfrm>
           <a:prstGeom prst="rect">
             <a:avLst/>
@@ -4039,15 +3935,16 @@
           </a:bodyPr>
           <a:lstStyle/>
           <a:p>
-            <a:r>
-              <a:rPr kumimoji="1" lang="en-US" altLang="ko-KR" sz="2800" b="1" dirty="0" smtClean="0">
+            <a:pPr algn="ctr"/>
+            <a:r>
+              <a:rPr kumimoji="1" lang="en-US" altLang="ko-KR" sz="3600" b="1" dirty="0" smtClean="0">
                 <a:solidFill>
                   <a:schemeClr val="bg1"/>
                 </a:solidFill>
               </a:rPr>
               <a:t>Hotkey</a:t>
             </a:r>
-            <a:endParaRPr kumimoji="1" lang="ko-KR" altLang="en-US" sz="2800" b="1" dirty="0">
+            <a:endParaRPr kumimoji="1" lang="ko-KR" altLang="en-US" sz="3600" b="1" dirty="0">
               <a:solidFill>
                 <a:schemeClr val="bg1"/>
               </a:solidFill>
@@ -4063,8 +3960,8 @@
         </p:nvSpPr>
         <p:spPr>
           <a:xfrm>
-            <a:off x="3100071" y="4121731"/>
-            <a:ext cx="1850571" cy="523220"/>
+            <a:off x="0" y="2628818"/>
+            <a:ext cx="12192002" cy="646331"/>
           </a:xfrm>
           <a:prstGeom prst="rect">
             <a:avLst/>
@@ -4077,8 +3974,9 @@
           </a:bodyPr>
           <a:lstStyle/>
           <a:p>
-            <a:r>
-              <a:rPr kumimoji="1" lang="en-US" altLang="ko-KR" sz="2800" b="1" dirty="0">
+            <a:pPr algn="ctr"/>
+            <a:r>
+              <a:rPr kumimoji="1" lang="en-US" altLang="ko-KR" sz="3600" b="1" dirty="0">
                 <a:solidFill>
                   <a:schemeClr val="bg1"/>
                 </a:solidFill>
@@ -4086,14 +3984,14 @@
               <a:t>C</a:t>
             </a:r>
             <a:r>
-              <a:rPr kumimoji="1" lang="en-US" altLang="ko-KR" sz="2800" b="1" dirty="0" smtClean="0">
+              <a:rPr kumimoji="1" lang="en-US" altLang="ko-KR" sz="3600" b="1" dirty="0" smtClean="0">
                 <a:solidFill>
                   <a:schemeClr val="bg1"/>
                 </a:solidFill>
               </a:rPr>
               <a:t>alculate</a:t>
             </a:r>
-            <a:endParaRPr kumimoji="1" lang="ko-KR" altLang="en-US" sz="2800" b="1" dirty="0">
+            <a:endParaRPr kumimoji="1" lang="ko-KR" altLang="en-US" sz="3600" b="1" dirty="0">
               <a:solidFill>
                 <a:schemeClr val="bg1"/>
               </a:solidFill>
@@ -4109,8 +4007,8 @@
         </p:nvSpPr>
         <p:spPr>
           <a:xfrm>
-            <a:off x="5908586" y="4132617"/>
-            <a:ext cx="2952385" cy="523220"/>
+            <a:off x="20174" y="4907420"/>
+            <a:ext cx="12157352" cy="646331"/>
           </a:xfrm>
           <a:prstGeom prst="rect">
             <a:avLst/>
@@ -4123,8 +4021,9 @@
           </a:bodyPr>
           <a:lstStyle/>
           <a:p>
-            <a:r>
-              <a:rPr kumimoji="1" lang="en-US" altLang="ko-KR" sz="2800" b="1" dirty="0" smtClean="0">
+            <a:pPr algn="ctr"/>
+            <a:r>
+              <a:rPr kumimoji="1" lang="en-US" altLang="ko-KR" sz="3600" b="1" dirty="0" smtClean="0">
                 <a:solidFill>
                   <a:schemeClr val="bg1"/>
                 </a:solidFill>
@@ -4132,14 +4031,14 @@
               <a:t>And so on </a:t>
             </a:r>
             <a:r>
-              <a:rPr kumimoji="1" lang="mr-IN" altLang="ko-KR" sz="2800" b="1" dirty="0" smtClean="0">
+              <a:rPr kumimoji="1" lang="mr-IN" altLang="ko-KR" sz="3600" b="1" dirty="0" smtClean="0">
                 <a:solidFill>
                   <a:schemeClr val="bg1"/>
                 </a:solidFill>
               </a:rPr>
               <a:t>…</a:t>
             </a:r>
-            <a:endParaRPr kumimoji="1" lang="ko-KR" altLang="en-US" sz="2800" b="1" dirty="0">
+            <a:endParaRPr kumimoji="1" lang="ko-KR" altLang="en-US" sz="3600" b="1" dirty="0">
               <a:solidFill>
                 <a:schemeClr val="bg1"/>
               </a:solidFill>
@@ -4155,8 +4054,8 @@
         </p:nvSpPr>
         <p:spPr>
           <a:xfrm>
-            <a:off x="7119260" y="1528775"/>
-            <a:ext cx="2952385" cy="523220"/>
+            <a:off x="1" y="3198469"/>
+            <a:ext cx="12191999" cy="646331"/>
           </a:xfrm>
           <a:prstGeom prst="rect">
             <a:avLst/>
@@ -4169,15 +4068,16 @@
           </a:bodyPr>
           <a:lstStyle/>
           <a:p>
-            <a:r>
-              <a:rPr kumimoji="1" lang="en-US" altLang="ko-KR" sz="2800" b="1" dirty="0" smtClean="0">
+            <a:pPr algn="ctr"/>
+            <a:r>
+              <a:rPr kumimoji="1" lang="en-US" altLang="ko-KR" sz="3600" b="1" dirty="0" smtClean="0">
                 <a:solidFill>
                   <a:schemeClr val="bg1"/>
                 </a:solidFill>
               </a:rPr>
               <a:t>Menu bar</a:t>
             </a:r>
-            <a:endParaRPr kumimoji="1" lang="ko-KR" altLang="en-US" sz="2800" b="1" dirty="0">
+            <a:endParaRPr kumimoji="1" lang="ko-KR" altLang="en-US" sz="3600" b="1" dirty="0">
               <a:solidFill>
                 <a:schemeClr val="bg1"/>
               </a:solidFill>
@@ -4193,8 +4093,8 @@
         </p:nvSpPr>
         <p:spPr>
           <a:xfrm>
-            <a:off x="7258413" y="2830696"/>
-            <a:ext cx="2952385" cy="523220"/>
+            <a:off x="20172" y="4337771"/>
+            <a:ext cx="12157354" cy="646331"/>
           </a:xfrm>
           <a:prstGeom prst="rect">
             <a:avLst/>
@@ -4207,15 +4107,16 @@
           </a:bodyPr>
           <a:lstStyle/>
           <a:p>
-            <a:r>
-              <a:rPr kumimoji="1" lang="en-US" altLang="ko-KR" sz="2800" b="1" smtClean="0">
+            <a:pPr algn="ctr"/>
+            <a:r>
+              <a:rPr kumimoji="1" lang="en-US" altLang="ko-KR" sz="3600" b="1" smtClean="0">
                 <a:solidFill>
                   <a:schemeClr val="bg1"/>
                 </a:solidFill>
               </a:rPr>
               <a:t>Design</a:t>
             </a:r>
-            <a:endParaRPr kumimoji="1" lang="ko-KR" altLang="en-US" sz="2800" b="1" dirty="0">
+            <a:endParaRPr kumimoji="1" lang="ko-KR" altLang="en-US" sz="3600" b="1" dirty="0">
               <a:solidFill>
                 <a:schemeClr val="bg1"/>
               </a:solidFill>
@@ -4318,7 +4219,7 @@
         </p:nvSpPr>
         <p:spPr>
           <a:xfrm>
-            <a:off x="2873829" y="500741"/>
+            <a:off x="3173632" y="500741"/>
             <a:ext cx="5856514" cy="5856514"/>
           </a:xfrm>
           <a:prstGeom prst="ellipse">
@@ -4354,15 +4255,45 @@
           <a:lstStyle/>
           <a:p>
             <a:pPr algn="ctr"/>
-            <a:r>
-              <a:rPr kumimoji="1" lang="en-US" altLang="ko-KR" smtClean="0">
+            <a:endParaRPr kumimoji="1" lang="ko-KR" altLang="en-US" dirty="0">
+              <a:solidFill>
+                <a:schemeClr val="accent2"/>
+              </a:solidFill>
+            </a:endParaRPr>
+          </a:p>
+        </p:txBody>
+      </p:sp>
+      <p:sp>
+        <p:nvSpPr>
+          <p:cNvPr id="5" name="텍스트 상자 5"/>
+          <p:cNvSpPr txBox="1"/>
+          <p:nvPr/>
+        </p:nvSpPr>
+        <p:spPr>
+          <a:xfrm>
+            <a:off x="4372934" y="3042238"/>
+            <a:ext cx="3517870" cy="769441"/>
+          </a:xfrm>
+          <a:prstGeom prst="rect">
+            <a:avLst/>
+          </a:prstGeom>
+          <a:noFill/>
+        </p:spPr>
+        <p:txBody>
+          <a:bodyPr wrap="square" rtlCol="0">
+            <a:spAutoFit/>
+          </a:bodyPr>
+          <a:lstStyle/>
+          <a:p>
+            <a:r>
+              <a:rPr kumimoji="1" lang="en-US" altLang="ko-KR" sz="4400" b="1" smtClean="0">
                 <a:solidFill>
                   <a:schemeClr val="accent2"/>
                 </a:solidFill>
               </a:rPr>
-              <a:t>THANK YOU !! </a:t>
-            </a:r>
-            <a:endParaRPr kumimoji="1" lang="ko-KR" altLang="en-US" dirty="0">
+              <a:t>THANK YOU!</a:t>
+            </a:r>
+            <a:endParaRPr kumimoji="1" lang="ko-KR" altLang="en-US" sz="4400" b="1" dirty="0">
               <a:solidFill>
                 <a:schemeClr val="accent2"/>
               </a:solidFill>
@@ -4554,7 +4485,7 @@
         </p:blipFill>
         <p:spPr>
           <a:xfrm>
-            <a:off x="1471386" y="1763484"/>
+            <a:off x="1816154" y="1868415"/>
             <a:ext cx="3009900" cy="4114800"/>
           </a:xfrm>
           <a:prstGeom prst="rect">
@@ -4570,7 +4501,7 @@
         </p:nvSpPr>
         <p:spPr>
           <a:xfrm>
-            <a:off x="0" y="-3"/>
+            <a:off x="-1" y="0"/>
             <a:ext cx="12192001" cy="6858003"/>
           </a:xfrm>
           <a:prstGeom prst="rect">
@@ -4658,7 +4589,7 @@
         </p:nvSpPr>
         <p:spPr>
           <a:xfrm>
-            <a:off x="2231570" y="2253343"/>
+            <a:off x="2681268" y="2358274"/>
             <a:ext cx="1458686" cy="3154710"/>
           </a:xfrm>
           <a:prstGeom prst="rect">
@@ -4673,7 +4604,7 @@
           <a:lstStyle/>
           <a:p>
             <a:r>
-              <a:rPr kumimoji="1" lang="en-US" altLang="ko-KR" sz="19900" b="1" smtClean="0">
+              <a:rPr kumimoji="1" lang="en-US" altLang="ko-KR" sz="19900" b="1" dirty="0" smtClean="0">
                 <a:solidFill>
                   <a:schemeClr val="bg1"/>
                 </a:solidFill>
@@ -4696,8 +4627,8 @@
         </p:nvSpPr>
         <p:spPr>
           <a:xfrm>
-            <a:off x="5268683" y="3118990"/>
-            <a:ext cx="4093029" cy="1077218"/>
+            <a:off x="5504066" y="3136613"/>
+            <a:ext cx="2721076" cy="584775"/>
           </a:xfrm>
           <a:prstGeom prst="rect">
             <a:avLst/>
@@ -4718,9 +4649,23 @@
               </a:rPr>
               <a:t>Calculator</a:t>
             </a:r>
-          </a:p>
-          <a:p>
-            <a:endParaRPr kumimoji="1" lang="ko-KR" altLang="en-US" sz="3200" b="1" dirty="0">
+            <a:r>
+              <a:rPr kumimoji="1" lang="ko-KR" altLang="en-US" sz="3200" b="1" dirty="0" smtClean="0">
+                <a:solidFill>
+                  <a:schemeClr val="bg1"/>
+                </a:solidFill>
+              </a:rPr>
+              <a:t> </a:t>
+            </a:r>
+            <a:r>
+              <a:rPr kumimoji="1" lang="en-US" altLang="ko-KR" sz="3200" b="1" dirty="0" smtClean="0">
+                <a:solidFill>
+                  <a:schemeClr val="bg1"/>
+                </a:solidFill>
+              </a:rPr>
+              <a:t>-</a:t>
+            </a:r>
+            <a:endParaRPr kumimoji="1" lang="en-US" altLang="ko-KR" sz="3200" b="1" dirty="0" smtClean="0">
               <a:solidFill>
                 <a:schemeClr val="bg1"/>
               </a:solidFill>
@@ -4736,7 +4681,7 @@
         </p:nvSpPr>
         <p:spPr>
           <a:xfrm>
-            <a:off x="7799613" y="2968080"/>
+            <a:off x="7945055" y="2985702"/>
             <a:ext cx="2579914" cy="830997"/>
           </a:xfrm>
           <a:prstGeom prst="rect">
@@ -4774,8 +4719,8 @@
         </p:nvSpPr>
         <p:spPr>
           <a:xfrm>
-            <a:off x="5486397" y="4621219"/>
-            <a:ext cx="4093029" cy="1077218"/>
+            <a:off x="7308417" y="3716441"/>
+            <a:ext cx="4093029" cy="584775"/>
           </a:xfrm>
           <a:prstGeom prst="rect">
             <a:avLst/>
@@ -4794,11 +4739,41 @@
                   <a:schemeClr val="bg1"/>
                 </a:solidFill>
               </a:rPr>
-              <a:t>JAVA 	Desktop</a:t>
-            </a:r>
-          </a:p>
-          <a:p>
-            <a:endParaRPr kumimoji="1" lang="ko-KR" altLang="en-US" sz="3200" b="1" dirty="0">
+              <a:t>JAVA</a:t>
+            </a:r>
+            <a:r>
+              <a:rPr kumimoji="1" lang="ko-KR" altLang="en-US" sz="3200" b="1" dirty="0" smtClean="0">
+                <a:solidFill>
+                  <a:schemeClr val="bg1"/>
+                </a:solidFill>
+              </a:rPr>
+              <a:t> </a:t>
+            </a:r>
+            <a:r>
+              <a:rPr kumimoji="1" lang="en-US" altLang="ko-KR" sz="3200" b="1" dirty="0" smtClean="0">
+                <a:solidFill>
+                  <a:schemeClr val="bg1"/>
+                </a:solidFill>
+              </a:rPr>
+              <a:t>Desktop</a:t>
+            </a:r>
+            <a:r>
+              <a:rPr kumimoji="1" lang="ko-KR" altLang="en-US" sz="3200" b="1" dirty="0" smtClean="0">
+                <a:solidFill>
+                  <a:schemeClr val="bg1"/>
+                </a:solidFill>
+              </a:rPr>
+              <a:t> </a:t>
+            </a:r>
+            <a:r>
+              <a:rPr kumimoji="1" lang="en-US" altLang="ko-KR" sz="3200" b="1" dirty="0" smtClean="0">
+                <a:solidFill>
+                  <a:schemeClr val="bg1"/>
+                </a:solidFill>
+              </a:rPr>
+              <a:t>App</a:t>
+            </a:r>
+            <a:endParaRPr kumimoji="1" lang="en-US" altLang="ko-KR" sz="3200" b="1" dirty="0" smtClean="0">
               <a:solidFill>
                 <a:schemeClr val="bg1"/>
               </a:solidFill>
@@ -4910,7 +4885,7 @@
           <a:solidFill>
             <a:schemeClr val="bg1"/>
           </a:solidFill>
-          <a:ln>
+          <a:ln w="38100">
             <a:solidFill>
               <a:schemeClr val="accent2"/>
             </a:solidFill>
@@ -4958,7 +4933,7 @@
           <a:solidFill>
             <a:schemeClr val="bg1"/>
           </a:solidFill>
-          <a:ln>
+          <a:ln w="38100">
             <a:solidFill>
               <a:schemeClr val="accent2"/>
             </a:solidFill>
@@ -5006,7 +4981,7 @@
           <a:solidFill>
             <a:schemeClr val="bg1"/>
           </a:solidFill>
-          <a:ln>
+          <a:ln w="38100">
             <a:solidFill>
               <a:schemeClr val="accent2"/>
             </a:solidFill>
@@ -5045,7 +5020,7 @@
         </p:nvSpPr>
         <p:spPr>
           <a:xfrm>
-            <a:off x="4793796" y="5820301"/>
+            <a:off x="4778806" y="5820301"/>
             <a:ext cx="2517323" cy="523220"/>
           </a:xfrm>
           <a:prstGeom prst="rect">
@@ -5061,7 +5036,7 @@
           <a:p>
             <a:pPr algn="ctr"/>
             <a:r>
-              <a:rPr lang="en-US" altLang="ko-KR" sz="2800" b="1">
+              <a:rPr lang="en-US" altLang="ko-KR" sz="2800" b="1" dirty="0">
                 <a:solidFill>
                   <a:schemeClr val="accent2"/>
                 </a:solidFill>
@@ -5084,7 +5059,7 @@
         </p:nvSpPr>
         <p:spPr>
           <a:xfrm>
-            <a:off x="1038223" y="5839247"/>
+            <a:off x="1233093" y="5839247"/>
             <a:ext cx="2517323" cy="523220"/>
           </a:xfrm>
           <a:prstGeom prst="rect">
@@ -5123,7 +5098,7 @@
         </p:nvSpPr>
         <p:spPr>
           <a:xfrm>
-            <a:off x="8375197" y="5820301"/>
+            <a:off x="8510107" y="5820301"/>
             <a:ext cx="2517323" cy="523220"/>
           </a:xfrm>
           <a:prstGeom prst="rect">
@@ -5200,7 +5175,7 @@
         </p:nvSpPr>
         <p:spPr>
           <a:xfrm>
-            <a:off x="4890747" y="2432581"/>
+            <a:off x="4877184" y="2567491"/>
             <a:ext cx="2410506" cy="461665"/>
           </a:xfrm>
           <a:prstGeom prst="rect">
@@ -5234,7 +5209,7 @@
         </p:nvSpPr>
         <p:spPr>
           <a:xfrm>
-            <a:off x="4890747" y="3051675"/>
+            <a:off x="4877184" y="3186585"/>
             <a:ext cx="2410506" cy="461665"/>
           </a:xfrm>
           <a:prstGeom prst="rect">
@@ -5250,18 +5225,13 @@
           <a:p>
             <a:pPr algn="ctr"/>
             <a:r>
-              <a:rPr kumimoji="1" lang="en-US" altLang="ko-KR" sz="2400" b="1" smtClean="0">
+              <a:rPr kumimoji="1" lang="en-US" altLang="ko-KR" sz="2400" b="1" dirty="0" smtClean="0">
                 <a:solidFill>
                   <a:schemeClr val="accent2"/>
                 </a:solidFill>
               </a:rPr>
               <a:t>Reading</a:t>
             </a:r>
-            <a:endParaRPr kumimoji="1" lang="en-US" altLang="ko-KR" sz="2400" b="1" dirty="0" smtClean="0">
-              <a:solidFill>
-                <a:schemeClr val="accent2"/>
-              </a:solidFill>
-            </a:endParaRPr>
           </a:p>
         </p:txBody>
       </p:sp>
@@ -5273,7 +5243,7 @@
         </p:nvSpPr>
         <p:spPr>
           <a:xfrm>
-            <a:off x="4847204" y="3674647"/>
+            <a:off x="4877184" y="3809557"/>
             <a:ext cx="2410506" cy="461665"/>
           </a:xfrm>
           <a:prstGeom prst="rect">
@@ -5289,18 +5259,13 @@
           <a:p>
             <a:pPr algn="ctr"/>
             <a:r>
-              <a:rPr kumimoji="1" lang="en-US" altLang="ko-KR" sz="2400" b="1" smtClean="0">
+              <a:rPr kumimoji="1" lang="en-US" altLang="ko-KR" sz="2400" b="1" dirty="0" smtClean="0">
                 <a:solidFill>
                   <a:schemeClr val="accent2"/>
                 </a:solidFill>
               </a:rPr>
               <a:t>Maintain</a:t>
             </a:r>
-            <a:endParaRPr kumimoji="1" lang="en-US" altLang="ko-KR" sz="2400" b="1" dirty="0" smtClean="0">
-              <a:solidFill>
-                <a:schemeClr val="accent2"/>
-              </a:solidFill>
-            </a:endParaRPr>
           </a:p>
         </p:txBody>
       </p:sp>
@@ -5312,7 +5277,7 @@
         </p:nvSpPr>
         <p:spPr>
           <a:xfrm>
-            <a:off x="4890747" y="4293741"/>
+            <a:off x="4877184" y="4428651"/>
             <a:ext cx="2410506" cy="461665"/>
           </a:xfrm>
           <a:prstGeom prst="rect">
@@ -5346,8 +5311,8 @@
         </p:nvSpPr>
         <p:spPr>
           <a:xfrm>
-            <a:off x="1298460" y="3051675"/>
-            <a:ext cx="2410506" cy="461665"/>
+            <a:off x="1049311" y="3111635"/>
+            <a:ext cx="2891702" cy="461665"/>
           </a:xfrm>
           <a:prstGeom prst="rect">
             <a:avLst/>
@@ -5380,8 +5345,8 @@
         </p:nvSpPr>
         <p:spPr>
           <a:xfrm>
-            <a:off x="1298460" y="3905479"/>
-            <a:ext cx="2410506" cy="461665"/>
+            <a:off x="1049311" y="3935459"/>
+            <a:ext cx="2891702" cy="461665"/>
           </a:xfrm>
           <a:prstGeom prst="rect">
             <a:avLst/>
@@ -5414,8 +5379,8 @@
         </p:nvSpPr>
         <p:spPr>
           <a:xfrm>
-            <a:off x="8526574" y="3905479"/>
-            <a:ext cx="2522425" cy="461665"/>
+            <a:off x="8297384" y="3905479"/>
+            <a:ext cx="2796586" cy="461665"/>
           </a:xfrm>
           <a:prstGeom prst="rect">
             <a:avLst/>
@@ -5448,8 +5413,8 @@
         </p:nvSpPr>
         <p:spPr>
           <a:xfrm>
-            <a:off x="8582534" y="3051674"/>
-            <a:ext cx="2410506" cy="461665"/>
+            <a:off x="8297383" y="3051674"/>
+            <a:ext cx="2796586" cy="461665"/>
           </a:xfrm>
           <a:prstGeom prst="rect">
             <a:avLst/>
@@ -5497,6 +5462,14 @@
 <file path=ppt/slides/slide5.xml><?xml version="1.0" encoding="utf-8"?>
 <p:sld xmlns:a="http://schemas.openxmlformats.org/drawingml/2006/main" xmlns:r="http://schemas.openxmlformats.org/officeDocument/2006/relationships" xmlns:p="http://schemas.openxmlformats.org/presentationml/2006/main">
   <p:cSld>
+    <p:bg>
+      <p:bgPr>
+        <a:solidFill>
+          <a:srgbClr val="4C4C4C"/>
+        </a:solidFill>
+        <a:effectLst/>
+      </p:bgPr>
+    </p:bg>
     <p:spTree>
       <p:nvGrpSpPr>
         <p:cNvPr id="1" name=""/>
@@ -5513,56 +5486,6 @@
       </p:grpSpPr>
       <p:sp>
         <p:nvSpPr>
-          <p:cNvPr id="4" name="직사각형 3"/>
-          <p:cNvSpPr/>
-          <p:nvPr/>
-        </p:nvSpPr>
-        <p:spPr>
-          <a:xfrm>
-            <a:off x="0" y="-3"/>
-            <a:ext cx="12192001" cy="6858003"/>
-          </a:xfrm>
-          <a:prstGeom prst="rect">
-            <a:avLst/>
-          </a:prstGeom>
-          <a:solidFill>
-            <a:schemeClr val="tx1">
-              <a:alpha val="70000"/>
-            </a:schemeClr>
-          </a:solidFill>
-          <a:ln>
-            <a:solidFill>
-              <a:schemeClr val="tx1"/>
-            </a:solidFill>
-          </a:ln>
-        </p:spPr>
-        <p:style>
-          <a:lnRef idx="2">
-            <a:schemeClr val="accent1">
-              <a:shade val="50000"/>
-            </a:schemeClr>
-          </a:lnRef>
-          <a:fillRef idx="1">
-            <a:schemeClr val="accent1"/>
-          </a:fillRef>
-          <a:effectRef idx="0">
-            <a:schemeClr val="accent1"/>
-          </a:effectRef>
-          <a:fontRef idx="minor">
-            <a:schemeClr val="lt1"/>
-          </a:fontRef>
-        </p:style>
-        <p:txBody>
-          <a:bodyPr rtlCol="0" anchor="ctr"/>
-          <a:lstStyle/>
-          <a:p>
-            <a:pPr algn="ctr"/>
-            <a:endParaRPr lang="ko-KR" altLang="en-US"/>
-          </a:p>
-        </p:txBody>
-      </p:sp>
-      <p:sp>
-        <p:nvSpPr>
           <p:cNvPr id="5" name="텍스트 상자 4"/>
           <p:cNvSpPr txBox="1"/>
           <p:nvPr/>
@@ -5621,7 +5544,7 @@
         </p:blipFill>
         <p:spPr>
           <a:xfrm>
-            <a:off x="2291442" y="1785257"/>
+            <a:off x="1883007" y="1810289"/>
             <a:ext cx="3009900" cy="4114800"/>
           </a:xfrm>
           <a:prstGeom prst="rect">
@@ -5637,8 +5560,8 @@
         </p:nvSpPr>
         <p:spPr>
           <a:xfrm>
-            <a:off x="6128657" y="2242457"/>
-            <a:ext cx="3233057" cy="646331"/>
+            <a:off x="6337335" y="2035167"/>
+            <a:ext cx="3959723" cy="646331"/>
           </a:xfrm>
           <a:prstGeom prst="rect">
             <a:avLst/>
@@ -5651,6 +5574,14 @@
           </a:bodyPr>
           <a:lstStyle/>
           <a:p>
+            <a:r>
+              <a:rPr kumimoji="1" lang="en-US" altLang="ko-KR" sz="3600" b="1" dirty="0" smtClean="0">
+                <a:solidFill>
+                  <a:schemeClr val="accent2"/>
+                </a:solidFill>
+              </a:rPr>
+              <a:t>General </a:t>
+            </a:r>
             <a:r>
               <a:rPr kumimoji="1" lang="en-US" altLang="ko-KR" sz="3600" b="1" dirty="0" smtClean="0">
                 <a:solidFill>
@@ -5669,14 +5600,14 @@
       </p:sp>
       <p:sp>
         <p:nvSpPr>
-          <p:cNvPr id="10" name="텍스트 상자 9"/>
+          <p:cNvPr id="8" name="텍스트 상자 8"/>
           <p:cNvSpPr txBox="1"/>
           <p:nvPr/>
         </p:nvSpPr>
         <p:spPr>
           <a:xfrm>
-            <a:off x="6525988" y="3003788"/>
-            <a:ext cx="2318657" cy="1938992"/>
+            <a:off x="7313269" y="2720044"/>
+            <a:ext cx="1003928" cy="584775"/>
           </a:xfrm>
           <a:prstGeom prst="rect">
             <a:avLst/>
@@ -5689,75 +5620,365 @@
           </a:bodyPr>
           <a:lstStyle/>
           <a:p>
-            <a:pPr marL="285750" indent="-285750">
-              <a:buFont typeface="Arial" charset="0"/>
-              <a:buChar char="•"/>
-            </a:pPr>
-            <a:r>
-              <a:rPr kumimoji="1" lang="en-US" altLang="ko-KR" sz="2400" b="1" dirty="0" smtClean="0">
+            <a:r>
+              <a:rPr kumimoji="1" lang="en-US" altLang="ko-KR" sz="3200" b="1" dirty="0" smtClean="0">
                 <a:solidFill>
                   <a:schemeClr val="bg1"/>
                 </a:solidFill>
               </a:rPr>
               <a:t>Plus</a:t>
             </a:r>
-          </a:p>
-          <a:p>
-            <a:pPr marL="285750" indent="-285750">
-              <a:buFont typeface="Arial" charset="0"/>
-              <a:buChar char="•"/>
-            </a:pPr>
-            <a:r>
-              <a:rPr kumimoji="1" lang="en-US" altLang="ko-KR" sz="2400" b="1" dirty="0" smtClean="0">
+            <a:endParaRPr kumimoji="1" lang="en-US" altLang="ko-KR" sz="3200" b="1" dirty="0" smtClean="0">
+              <a:solidFill>
+                <a:schemeClr val="bg1"/>
+              </a:solidFill>
+            </a:endParaRPr>
+          </a:p>
+        </p:txBody>
+      </p:sp>
+      <p:sp>
+        <p:nvSpPr>
+          <p:cNvPr id="11" name="텍스트 상자 10"/>
+          <p:cNvSpPr txBox="1"/>
+          <p:nvPr/>
+        </p:nvSpPr>
+        <p:spPr>
+          <a:xfrm>
+            <a:off x="6755281" y="2658488"/>
+            <a:ext cx="45719" cy="646331"/>
+          </a:xfrm>
+          <a:prstGeom prst="rect">
+            <a:avLst/>
+          </a:prstGeom>
+          <a:noFill/>
+        </p:spPr>
+        <p:txBody>
+          <a:bodyPr wrap="square" rtlCol="0">
+            <a:spAutoFit/>
+          </a:bodyPr>
+          <a:lstStyle/>
+          <a:p>
+            <a:r>
+              <a:rPr kumimoji="1" lang="en-US" altLang="ko-KR" sz="3600" b="1" dirty="0">
+                <a:solidFill>
+                  <a:schemeClr val="accent2"/>
+                </a:solidFill>
+              </a:rPr>
+              <a:t>+</a:t>
+            </a:r>
+            <a:endParaRPr kumimoji="1" lang="ko-KR" altLang="en-US" sz="3600" b="1" dirty="0">
+              <a:solidFill>
+                <a:schemeClr val="accent2"/>
+              </a:solidFill>
+            </a:endParaRPr>
+          </a:p>
+        </p:txBody>
+      </p:sp>
+      <p:sp>
+        <p:nvSpPr>
+          <p:cNvPr id="12" name="텍스트 상자 11"/>
+          <p:cNvSpPr txBox="1"/>
+          <p:nvPr/>
+        </p:nvSpPr>
+        <p:spPr>
+          <a:xfrm>
+            <a:off x="6755281" y="3090910"/>
+            <a:ext cx="45719" cy="923330"/>
+          </a:xfrm>
+          <a:prstGeom prst="rect">
+            <a:avLst/>
+          </a:prstGeom>
+          <a:noFill/>
+        </p:spPr>
+        <p:txBody>
+          <a:bodyPr wrap="square" rtlCol="0">
+            <a:spAutoFit/>
+          </a:bodyPr>
+          <a:lstStyle/>
+          <a:p>
+            <a:r>
+              <a:rPr kumimoji="1" lang="en-US" altLang="ko-KR" sz="5400" b="1" dirty="0" smtClean="0">
+                <a:solidFill>
+                  <a:schemeClr val="accent2"/>
+                </a:solidFill>
+              </a:rPr>
+              <a:t>-</a:t>
+            </a:r>
+            <a:endParaRPr kumimoji="1" lang="ko-KR" altLang="en-US" sz="5400" b="1" dirty="0">
+              <a:solidFill>
+                <a:schemeClr val="accent2"/>
+              </a:solidFill>
+            </a:endParaRPr>
+          </a:p>
+        </p:txBody>
+      </p:sp>
+      <p:sp>
+        <p:nvSpPr>
+          <p:cNvPr id="13" name="텍스트 상자 12"/>
+          <p:cNvSpPr txBox="1"/>
+          <p:nvPr/>
+        </p:nvSpPr>
+        <p:spPr>
+          <a:xfrm>
+            <a:off x="6755281" y="3854157"/>
+            <a:ext cx="45719" cy="646331"/>
+          </a:xfrm>
+          <a:prstGeom prst="rect">
+            <a:avLst/>
+          </a:prstGeom>
+          <a:noFill/>
+        </p:spPr>
+        <p:txBody>
+          <a:bodyPr wrap="square" rtlCol="0">
+            <a:spAutoFit/>
+          </a:bodyPr>
+          <a:lstStyle/>
+          <a:p>
+            <a:r>
+              <a:rPr kumimoji="1" lang="en-US" altLang="ko-KR" sz="3600" b="1" dirty="0">
+                <a:solidFill>
+                  <a:schemeClr val="accent2"/>
+                </a:solidFill>
+              </a:rPr>
+              <a:t>x</a:t>
+            </a:r>
+            <a:endParaRPr kumimoji="1" lang="ko-KR" altLang="en-US" sz="3600" b="1" dirty="0">
+              <a:solidFill>
+                <a:schemeClr val="accent2"/>
+              </a:solidFill>
+            </a:endParaRPr>
+          </a:p>
+        </p:txBody>
+      </p:sp>
+      <p:sp>
+        <p:nvSpPr>
+          <p:cNvPr id="14" name="텍스트 상자 13"/>
+          <p:cNvSpPr txBox="1"/>
+          <p:nvPr/>
+        </p:nvSpPr>
+        <p:spPr>
+          <a:xfrm>
+            <a:off x="6755281" y="5006316"/>
+            <a:ext cx="45719" cy="646331"/>
+          </a:xfrm>
+          <a:prstGeom prst="rect">
+            <a:avLst/>
+          </a:prstGeom>
+          <a:noFill/>
+        </p:spPr>
+        <p:txBody>
+          <a:bodyPr wrap="square" rtlCol="0">
+            <a:spAutoFit/>
+          </a:bodyPr>
+          <a:lstStyle/>
+          <a:p>
+            <a:r>
+              <a:rPr kumimoji="1" lang="en-US" altLang="ko-KR" sz="3600" b="1" dirty="0" smtClean="0">
+                <a:solidFill>
+                  <a:schemeClr val="accent2"/>
+                </a:solidFill>
+              </a:rPr>
+              <a:t>%</a:t>
+            </a:r>
+            <a:endParaRPr kumimoji="1" lang="ko-KR" altLang="en-US" sz="3600" b="1" dirty="0">
+              <a:solidFill>
+                <a:schemeClr val="accent2"/>
+              </a:solidFill>
+            </a:endParaRPr>
+          </a:p>
+        </p:txBody>
+      </p:sp>
+      <p:sp>
+        <p:nvSpPr>
+          <p:cNvPr id="15" name="텍스트 상자 14"/>
+          <p:cNvSpPr txBox="1"/>
+          <p:nvPr/>
+        </p:nvSpPr>
+        <p:spPr>
+          <a:xfrm>
+            <a:off x="7313268" y="3311050"/>
+            <a:ext cx="1874105" cy="584775"/>
+          </a:xfrm>
+          <a:prstGeom prst="rect">
+            <a:avLst/>
+          </a:prstGeom>
+          <a:noFill/>
+        </p:spPr>
+        <p:txBody>
+          <a:bodyPr wrap="square" rtlCol="0">
+            <a:spAutoFit/>
+          </a:bodyPr>
+          <a:lstStyle/>
+          <a:p>
+            <a:r>
+              <a:rPr kumimoji="1" lang="en-US" altLang="ko-KR" sz="3200" b="1" dirty="0" smtClean="0">
                 <a:solidFill>
                   <a:schemeClr val="bg1"/>
                 </a:solidFill>
               </a:rPr>
               <a:t>Minus</a:t>
             </a:r>
-          </a:p>
-          <a:p>
-            <a:pPr marL="285750" indent="-285750">
-              <a:buFont typeface="Arial" charset="0"/>
-              <a:buChar char="•"/>
-            </a:pPr>
-            <a:r>
-              <a:rPr lang="en-US" altLang="ko-KR" sz="2400" b="1" dirty="0" smtClean="0">
+            <a:endParaRPr kumimoji="1" lang="ko-KR" altLang="en-US" sz="3200" b="1" dirty="0">
+              <a:solidFill>
+                <a:schemeClr val="bg1"/>
+              </a:solidFill>
+            </a:endParaRPr>
+          </a:p>
+        </p:txBody>
+      </p:sp>
+      <p:sp>
+        <p:nvSpPr>
+          <p:cNvPr id="16" name="텍스트 상자 15"/>
+          <p:cNvSpPr txBox="1"/>
+          <p:nvPr/>
+        </p:nvSpPr>
+        <p:spPr>
+          <a:xfrm>
+            <a:off x="7207313" y="3887988"/>
+            <a:ext cx="1874105" cy="584775"/>
+          </a:xfrm>
+          <a:prstGeom prst="rect">
+            <a:avLst/>
+          </a:prstGeom>
+          <a:noFill/>
+        </p:spPr>
+        <p:txBody>
+          <a:bodyPr wrap="square" rtlCol="0">
+            <a:spAutoFit/>
+          </a:bodyPr>
+          <a:lstStyle/>
+          <a:p>
+            <a:r>
+              <a:rPr kumimoji="1" lang="en-US" altLang="ko-KR" sz="3200" b="1" dirty="0" smtClean="0">
                 <a:solidFill>
                   <a:schemeClr val="bg1"/>
                 </a:solidFill>
               </a:rPr>
               <a:t>Multiply</a:t>
             </a:r>
-          </a:p>
-          <a:p>
-            <a:pPr marL="285750" indent="-285750">
-              <a:buFont typeface="Arial" charset="0"/>
-              <a:buChar char="•"/>
-            </a:pPr>
-            <a:r>
-              <a:rPr lang="en-US" altLang="ko-KR" sz="2400" b="1" dirty="0" smtClean="0">
+            <a:endParaRPr kumimoji="1" lang="ko-KR" altLang="en-US" sz="3200" b="1" dirty="0">
+              <a:solidFill>
+                <a:schemeClr val="bg1"/>
+              </a:solidFill>
+            </a:endParaRPr>
+          </a:p>
+        </p:txBody>
+      </p:sp>
+      <p:sp>
+        <p:nvSpPr>
+          <p:cNvPr id="17" name="텍스트 상자 16"/>
+          <p:cNvSpPr txBox="1"/>
+          <p:nvPr/>
+        </p:nvSpPr>
+        <p:spPr>
+          <a:xfrm>
+            <a:off x="7246089" y="4478994"/>
+            <a:ext cx="1874105" cy="584775"/>
+          </a:xfrm>
+          <a:prstGeom prst="rect">
+            <a:avLst/>
+          </a:prstGeom>
+          <a:noFill/>
+        </p:spPr>
+        <p:txBody>
+          <a:bodyPr wrap="square" rtlCol="0">
+            <a:spAutoFit/>
+          </a:bodyPr>
+          <a:lstStyle/>
+          <a:p>
+            <a:r>
+              <a:rPr kumimoji="1" lang="en-US" altLang="ko-KR" sz="3200" b="1" smtClean="0">
                 <a:solidFill>
                   <a:schemeClr val="bg1"/>
                 </a:solidFill>
               </a:rPr>
               <a:t>Division</a:t>
             </a:r>
-          </a:p>
-          <a:p>
-            <a:pPr marL="285750" indent="-285750">
-              <a:buFont typeface="Arial" charset="0"/>
-              <a:buChar char="•"/>
-            </a:pPr>
-            <a:r>
-              <a:rPr kumimoji="1" lang="en-US" altLang="ko-KR" sz="2400" b="1" dirty="0" smtClean="0">
+            <a:endParaRPr kumimoji="1" lang="ko-KR" altLang="en-US" sz="3200" b="1" dirty="0">
+              <a:solidFill>
+                <a:schemeClr val="bg1"/>
+              </a:solidFill>
+            </a:endParaRPr>
+          </a:p>
+        </p:txBody>
+      </p:sp>
+      <p:sp>
+        <p:nvSpPr>
+          <p:cNvPr id="18" name="텍스트 상자 13"/>
+          <p:cNvSpPr txBox="1"/>
+          <p:nvPr/>
+        </p:nvSpPr>
+        <p:spPr>
+          <a:xfrm>
+            <a:off x="6755281" y="4429878"/>
+            <a:ext cx="45719" cy="646331"/>
+          </a:xfrm>
+          <a:prstGeom prst="rect">
+            <a:avLst/>
+          </a:prstGeom>
+          <a:noFill/>
+        </p:spPr>
+        <p:txBody>
+          <a:bodyPr wrap="square" rtlCol="0">
+            <a:spAutoFit/>
+          </a:bodyPr>
+          <a:lstStyle/>
+          <a:p>
+            <a:r>
+              <a:rPr kumimoji="1" lang="en-US" altLang="ko-KR" sz="3600" b="1" dirty="0">
+                <a:solidFill>
+                  <a:schemeClr val="accent2"/>
+                </a:solidFill>
+              </a:rPr>
+              <a:t>/</a:t>
+            </a:r>
+            <a:r>
+              <a:rPr kumimoji="1" lang="en-US" altLang="ko-KR" sz="3600" b="1" smtClean="0">
+                <a:solidFill>
+                  <a:schemeClr val="accent2"/>
+                </a:solidFill>
+              </a:rPr>
+              <a:t> </a:t>
+            </a:r>
+            <a:endParaRPr kumimoji="1" lang="ko-KR" altLang="en-US" sz="3600" b="1" dirty="0">
+              <a:solidFill>
+                <a:schemeClr val="accent2"/>
+              </a:solidFill>
+            </a:endParaRPr>
+          </a:p>
+        </p:txBody>
+      </p:sp>
+      <p:sp>
+        <p:nvSpPr>
+          <p:cNvPr id="19" name="텍스트 상자 16"/>
+          <p:cNvSpPr txBox="1"/>
+          <p:nvPr/>
+        </p:nvSpPr>
+        <p:spPr>
+          <a:xfrm>
+            <a:off x="7246089" y="5013727"/>
+            <a:ext cx="1874105" cy="584775"/>
+          </a:xfrm>
+          <a:prstGeom prst="rect">
+            <a:avLst/>
+          </a:prstGeom>
+          <a:noFill/>
+        </p:spPr>
+        <p:txBody>
+          <a:bodyPr wrap="square" rtlCol="0">
+            <a:spAutoFit/>
+          </a:bodyPr>
+          <a:lstStyle/>
+          <a:p>
+            <a:r>
+              <a:rPr kumimoji="1" lang="en-US" altLang="ko-KR" sz="3200" b="1" dirty="0" smtClean="0">
                 <a:solidFill>
                   <a:schemeClr val="bg1"/>
                 </a:solidFill>
               </a:rPr>
               <a:t>Percent</a:t>
             </a:r>
-            <a:endParaRPr kumimoji="1" lang="ko-KR" altLang="en-US" sz="2400" b="1" dirty="0">
+            <a:endParaRPr kumimoji="1" lang="ko-KR" altLang="en-US" sz="3200" b="1" dirty="0">
               <a:solidFill>
                 <a:schemeClr val="bg1"/>
               </a:solidFill>
@@ -5788,6 +6009,14 @@
 <file path=ppt/slides/slide6.xml><?xml version="1.0" encoding="utf-8"?>
 <p:sld xmlns:a="http://schemas.openxmlformats.org/drawingml/2006/main" xmlns:r="http://schemas.openxmlformats.org/officeDocument/2006/relationships" xmlns:p="http://schemas.openxmlformats.org/presentationml/2006/main">
   <p:cSld>
+    <p:bg>
+      <p:bgPr>
+        <a:solidFill>
+          <a:srgbClr val="4C4C4C"/>
+        </a:solidFill>
+        <a:effectLst/>
+      </p:bgPr>
+    </p:bg>
     <p:spTree>
       <p:nvGrpSpPr>
         <p:cNvPr id="1" name=""/>
@@ -5804,56 +6033,6 @@
       </p:grpSpPr>
       <p:sp>
         <p:nvSpPr>
-          <p:cNvPr id="4" name="직사각형 3"/>
-          <p:cNvSpPr/>
-          <p:nvPr/>
-        </p:nvSpPr>
-        <p:spPr>
-          <a:xfrm>
-            <a:off x="0" y="-3"/>
-            <a:ext cx="12192001" cy="6858003"/>
-          </a:xfrm>
-          <a:prstGeom prst="rect">
-            <a:avLst/>
-          </a:prstGeom>
-          <a:solidFill>
-            <a:schemeClr val="tx1">
-              <a:alpha val="70000"/>
-            </a:schemeClr>
-          </a:solidFill>
-          <a:ln>
-            <a:solidFill>
-              <a:schemeClr val="tx1"/>
-            </a:solidFill>
-          </a:ln>
-        </p:spPr>
-        <p:style>
-          <a:lnRef idx="2">
-            <a:schemeClr val="accent1">
-              <a:shade val="50000"/>
-            </a:schemeClr>
-          </a:lnRef>
-          <a:fillRef idx="1">
-            <a:schemeClr val="accent1"/>
-          </a:fillRef>
-          <a:effectRef idx="0">
-            <a:schemeClr val="accent1"/>
-          </a:effectRef>
-          <a:fontRef idx="minor">
-            <a:schemeClr val="lt1"/>
-          </a:fontRef>
-        </p:style>
-        <p:txBody>
-          <a:bodyPr rtlCol="0" anchor="ctr"/>
-          <a:lstStyle/>
-          <a:p>
-            <a:pPr algn="ctr"/>
-            <a:endParaRPr lang="ko-KR" altLang="en-US" dirty="0"/>
-          </a:p>
-        </p:txBody>
-      </p:sp>
-      <p:sp>
-        <p:nvSpPr>
           <p:cNvPr id="5" name="텍스트 상자 4"/>
           <p:cNvSpPr txBox="1"/>
           <p:nvPr/>
@@ -5912,7 +6091,7 @@
         </p:blipFill>
         <p:spPr>
           <a:xfrm>
-            <a:off x="937986" y="2256188"/>
+            <a:off x="1251923" y="3351620"/>
             <a:ext cx="4089400" cy="774700"/>
           </a:xfrm>
           <a:prstGeom prst="rect">
@@ -5922,14 +6101,14 @@
       </p:pic>
       <p:sp>
         <p:nvSpPr>
-          <p:cNvPr id="8" name="텍스트 상자 7"/>
+          <p:cNvPr id="9" name="텍스트 상자 8"/>
           <p:cNvSpPr txBox="1"/>
           <p:nvPr/>
         </p:nvSpPr>
         <p:spPr>
           <a:xfrm>
-            <a:off x="1101816" y="1328739"/>
-            <a:ext cx="4036242" cy="584775"/>
+            <a:off x="6629928" y="2773262"/>
+            <a:ext cx="5379191" cy="584775"/>
           </a:xfrm>
           <a:prstGeom prst="rect">
             <a:avLst/>
@@ -5945,12 +6124,58 @@
             <a:r>
               <a:rPr kumimoji="1" lang="en-US" altLang="ko-KR" sz="3200" b="1" dirty="0" smtClean="0">
                 <a:solidFill>
+                  <a:schemeClr val="bg1"/>
+                </a:solidFill>
+              </a:rPr>
+              <a:t>Distinction prime </a:t>
+            </a:r>
+            <a:r>
+              <a:rPr kumimoji="1" lang="en-US" altLang="ko-KR" sz="3200" b="1" dirty="0" smtClean="0">
+                <a:solidFill>
+                  <a:schemeClr val="bg1"/>
+                </a:solidFill>
+              </a:rPr>
+              <a:t>number</a:t>
+            </a:r>
+            <a:endParaRPr kumimoji="1" lang="en-US" altLang="ko-KR" sz="3200" b="1" dirty="0" smtClean="0">
+              <a:solidFill>
+                <a:schemeClr val="bg1"/>
+              </a:solidFill>
+            </a:endParaRPr>
+          </a:p>
+        </p:txBody>
+      </p:sp>
+      <p:sp>
+        <p:nvSpPr>
+          <p:cNvPr id="11" name="텍스트 상자 10"/>
+          <p:cNvSpPr txBox="1"/>
+          <p:nvPr/>
+        </p:nvSpPr>
+        <p:spPr>
+          <a:xfrm>
+            <a:off x="6071940" y="2755900"/>
+            <a:ext cx="340625" cy="646331"/>
+          </a:xfrm>
+          <a:prstGeom prst="rect">
+            <a:avLst/>
+          </a:prstGeom>
+          <a:noFill/>
+        </p:spPr>
+        <p:txBody>
+          <a:bodyPr wrap="square" rtlCol="0">
+            <a:spAutoFit/>
+          </a:bodyPr>
+          <a:lstStyle/>
+          <a:p>
+            <a:r>
+              <a:rPr kumimoji="1" lang="en-US" altLang="ko-KR" sz="3600" b="1" dirty="0" smtClean="0">
+                <a:solidFill>
                   <a:schemeClr val="accent2"/>
                 </a:solidFill>
               </a:rPr>
-              <a:t>New Function</a:t>
-            </a:r>
-            <a:endParaRPr kumimoji="1" lang="ko-KR" altLang="en-US" sz="3200" b="1" dirty="0">
+              <a:t>P </a:t>
+            </a:r>
+            <a:endParaRPr kumimoji="1" lang="ko-KR" altLang="en-US" sz="3600" b="1" dirty="0">
               <a:solidFill>
                 <a:schemeClr val="accent2"/>
               </a:solidFill>
@@ -5960,14 +6185,14 @@
       </p:sp>
       <p:sp>
         <p:nvSpPr>
-          <p:cNvPr id="9" name="텍스트 상자 8"/>
+          <p:cNvPr id="12" name="텍스트 상자 11"/>
           <p:cNvSpPr txBox="1"/>
           <p:nvPr/>
         </p:nvSpPr>
         <p:spPr>
           <a:xfrm>
-            <a:off x="829673" y="4122694"/>
-            <a:ext cx="4308386" cy="830997"/>
+            <a:off x="6080727" y="3465533"/>
+            <a:ext cx="1410184" cy="646331"/>
           </a:xfrm>
           <a:prstGeom prst="rect">
             <a:avLst/>
@@ -5981,24 +6206,128 @@
           <a:lstStyle/>
           <a:p>
             <a:r>
-              <a:rPr kumimoji="1" lang="en-US" altLang="ko-KR" sz="2400" b="1" dirty="0" smtClean="0">
+              <a:rPr kumimoji="1" lang="en-US" altLang="ko-KR" sz="3600" b="1" dirty="0" smtClean="0">
+                <a:solidFill>
+                  <a:schemeClr val="accent2"/>
+                </a:solidFill>
+              </a:rPr>
+              <a:t>MOD </a:t>
+            </a:r>
+            <a:endParaRPr kumimoji="1" lang="ko-KR" altLang="en-US" sz="3600" b="1" dirty="0">
+              <a:solidFill>
+                <a:schemeClr val="accent2"/>
+              </a:solidFill>
+            </a:endParaRPr>
+          </a:p>
+        </p:txBody>
+      </p:sp>
+      <p:sp>
+        <p:nvSpPr>
+          <p:cNvPr id="13" name="텍스트 상자 12"/>
+          <p:cNvSpPr txBox="1"/>
+          <p:nvPr/>
+        </p:nvSpPr>
+        <p:spPr>
+          <a:xfrm>
+            <a:off x="6080725" y="4175166"/>
+            <a:ext cx="1410185" cy="646331"/>
+          </a:xfrm>
+          <a:prstGeom prst="rect">
+            <a:avLst/>
+          </a:prstGeom>
+          <a:noFill/>
+        </p:spPr>
+        <p:txBody>
+          <a:bodyPr wrap="square" rtlCol="0">
+            <a:spAutoFit/>
+          </a:bodyPr>
+          <a:lstStyle/>
+          <a:p>
+            <a:r>
+              <a:rPr kumimoji="1" lang="en-US" altLang="ko-KR" sz="3600" b="1" dirty="0" smtClean="0">
+                <a:solidFill>
+                  <a:schemeClr val="accent2"/>
+                </a:solidFill>
+              </a:rPr>
+              <a:t>AVG </a:t>
+            </a:r>
+            <a:endParaRPr kumimoji="1" lang="ko-KR" altLang="en-US" sz="3600" b="1" dirty="0">
+              <a:solidFill>
+                <a:schemeClr val="accent2"/>
+              </a:solidFill>
+            </a:endParaRPr>
+          </a:p>
+        </p:txBody>
+      </p:sp>
+      <p:sp>
+        <p:nvSpPr>
+          <p:cNvPr id="14" name="텍스트 상자 13"/>
+          <p:cNvSpPr txBox="1"/>
+          <p:nvPr/>
+        </p:nvSpPr>
+        <p:spPr>
+          <a:xfrm>
+            <a:off x="6080725" y="4884800"/>
+            <a:ext cx="340625" cy="646331"/>
+          </a:xfrm>
+          <a:prstGeom prst="rect">
+            <a:avLst/>
+          </a:prstGeom>
+          <a:noFill/>
+        </p:spPr>
+        <p:txBody>
+          <a:bodyPr wrap="square" rtlCol="0">
+            <a:spAutoFit/>
+          </a:bodyPr>
+          <a:lstStyle/>
+          <a:p>
+            <a:r>
+              <a:rPr kumimoji="1" lang="en-US" altLang="ko-KR" sz="3600" b="1" dirty="0" smtClean="0">
+                <a:solidFill>
+                  <a:schemeClr val="accent2"/>
+                </a:solidFill>
+              </a:rPr>
+              <a:t>! </a:t>
+            </a:r>
+            <a:endParaRPr kumimoji="1" lang="ko-KR" altLang="en-US" sz="3600" b="1" dirty="0">
+              <a:solidFill>
+                <a:schemeClr val="accent2"/>
+              </a:solidFill>
+            </a:endParaRPr>
+          </a:p>
+        </p:txBody>
+      </p:sp>
+      <p:sp>
+        <p:nvSpPr>
+          <p:cNvPr id="15" name="텍스트 상자 14"/>
+          <p:cNvSpPr txBox="1"/>
+          <p:nvPr/>
+        </p:nvSpPr>
+        <p:spPr>
+          <a:xfrm>
+            <a:off x="7416631" y="3497627"/>
+            <a:ext cx="2557964" cy="584775"/>
+          </a:xfrm>
+          <a:prstGeom prst="rect">
+            <a:avLst/>
+          </a:prstGeom>
+          <a:noFill/>
+        </p:spPr>
+        <p:txBody>
+          <a:bodyPr wrap="square" rtlCol="0">
+            <a:spAutoFit/>
+          </a:bodyPr>
+          <a:lstStyle/>
+          <a:p>
+            <a:r>
+              <a:rPr kumimoji="1" lang="en-US" altLang="ko-KR" sz="3200" b="1" dirty="0" smtClean="0">
                 <a:solidFill>
                   <a:schemeClr val="bg1"/>
                 </a:solidFill>
               </a:rPr>
-              <a:t>Distinction prime number</a:t>
-            </a:r>
-          </a:p>
-          <a:p>
-            <a:r>
-              <a:rPr kumimoji="1" lang="en-US" altLang="ko-KR" sz="2400" b="1" dirty="0" smtClean="0">
-                <a:solidFill>
-                  <a:schemeClr val="bg1"/>
-                </a:solidFill>
-              </a:rPr>
-              <a:t>- True or False </a:t>
-            </a:r>
-            <a:endParaRPr kumimoji="1" lang="ko-KR" altLang="en-US" sz="2400" b="1" dirty="0">
+              <a:t>Remainder</a:t>
+            </a:r>
+            <a:endParaRPr kumimoji="1" lang="ko-KR" altLang="en-US" sz="3200" b="1" dirty="0">
               <a:solidFill>
                 <a:schemeClr val="bg1"/>
               </a:solidFill>
@@ -6008,14 +6337,14 @@
       </p:sp>
       <p:sp>
         <p:nvSpPr>
-          <p:cNvPr id="11" name="텍스트 상자 10"/>
+          <p:cNvPr id="16" name="텍스트 상자 15"/>
           <p:cNvSpPr txBox="1"/>
           <p:nvPr/>
         </p:nvSpPr>
         <p:spPr>
           <a:xfrm>
-            <a:off x="1090930" y="3258918"/>
-            <a:ext cx="672556" cy="584775"/>
+            <a:off x="7224852" y="4221992"/>
+            <a:ext cx="2557964" cy="584775"/>
           </a:xfrm>
           <a:prstGeom prst="rect">
             <a:avLst/>
@@ -6031,164 +6360,12 @@
             <a:r>
               <a:rPr kumimoji="1" lang="en-US" altLang="ko-KR" sz="3200" b="1" smtClean="0">
                 <a:solidFill>
-                  <a:schemeClr val="accent2"/>
-                </a:solidFill>
-              </a:rPr>
-              <a:t>P </a:t>
+                  <a:schemeClr val="bg1"/>
+                </a:solidFill>
+              </a:rPr>
+              <a:t>Average</a:t>
             </a:r>
             <a:endParaRPr kumimoji="1" lang="ko-KR" altLang="en-US" sz="3200" b="1" dirty="0">
-              <a:solidFill>
-                <a:schemeClr val="accent2"/>
-              </a:solidFill>
-            </a:endParaRPr>
-          </a:p>
-        </p:txBody>
-      </p:sp>
-      <p:sp>
-        <p:nvSpPr>
-          <p:cNvPr id="12" name="텍스트 상자 11"/>
-          <p:cNvSpPr txBox="1"/>
-          <p:nvPr/>
-        </p:nvSpPr>
-        <p:spPr>
-          <a:xfrm>
-            <a:off x="1711415" y="3255623"/>
-            <a:ext cx="3219813" cy="584775"/>
-          </a:xfrm>
-          <a:prstGeom prst="rect">
-            <a:avLst/>
-          </a:prstGeom>
-          <a:noFill/>
-        </p:spPr>
-        <p:txBody>
-          <a:bodyPr wrap="square" rtlCol="0">
-            <a:spAutoFit/>
-          </a:bodyPr>
-          <a:lstStyle/>
-          <a:p>
-            <a:r>
-              <a:rPr kumimoji="1" lang="en-US" altLang="ko-KR" sz="3200" b="1" smtClean="0">
-                <a:solidFill>
-                  <a:schemeClr val="accent2"/>
-                </a:solidFill>
-              </a:rPr>
-              <a:t>MOD </a:t>
-            </a:r>
-            <a:endParaRPr kumimoji="1" lang="ko-KR" altLang="en-US" sz="3200" b="1" dirty="0">
-              <a:solidFill>
-                <a:schemeClr val="accent2"/>
-              </a:solidFill>
-            </a:endParaRPr>
-          </a:p>
-        </p:txBody>
-      </p:sp>
-      <p:sp>
-        <p:nvSpPr>
-          <p:cNvPr id="13" name="텍스트 상자 12"/>
-          <p:cNvSpPr txBox="1"/>
-          <p:nvPr/>
-        </p:nvSpPr>
-        <p:spPr>
-          <a:xfrm>
-            <a:off x="6642645" y="2738500"/>
-            <a:ext cx="2784384" cy="584775"/>
-          </a:xfrm>
-          <a:prstGeom prst="rect">
-            <a:avLst/>
-          </a:prstGeom>
-          <a:noFill/>
-        </p:spPr>
-        <p:txBody>
-          <a:bodyPr wrap="square" rtlCol="0">
-            <a:spAutoFit/>
-          </a:bodyPr>
-          <a:lstStyle/>
-          <a:p>
-            <a:r>
-              <a:rPr kumimoji="1" lang="en-US" altLang="ko-KR" sz="3200" b="1" dirty="0" smtClean="0">
-                <a:solidFill>
-                  <a:schemeClr val="accent2"/>
-                </a:solidFill>
-              </a:rPr>
-              <a:t>AVG </a:t>
-            </a:r>
-            <a:endParaRPr kumimoji="1" lang="ko-KR" altLang="en-US" sz="3200" b="1" dirty="0">
-              <a:solidFill>
-                <a:schemeClr val="accent2"/>
-              </a:solidFill>
-            </a:endParaRPr>
-          </a:p>
-        </p:txBody>
-      </p:sp>
-      <p:sp>
-        <p:nvSpPr>
-          <p:cNvPr id="14" name="텍스트 상자 13"/>
-          <p:cNvSpPr txBox="1"/>
-          <p:nvPr/>
-        </p:nvSpPr>
-        <p:spPr>
-          <a:xfrm>
-            <a:off x="6978923" y="3830307"/>
-            <a:ext cx="672556" cy="584775"/>
-          </a:xfrm>
-          <a:prstGeom prst="rect">
-            <a:avLst/>
-          </a:prstGeom>
-          <a:noFill/>
-        </p:spPr>
-        <p:txBody>
-          <a:bodyPr wrap="square" rtlCol="0">
-            <a:spAutoFit/>
-          </a:bodyPr>
-          <a:lstStyle/>
-          <a:p>
-            <a:r>
-              <a:rPr kumimoji="1" lang="en-US" altLang="ko-KR" sz="3200" b="1" dirty="0" smtClean="0">
-                <a:solidFill>
-                  <a:schemeClr val="accent2"/>
-                </a:solidFill>
-              </a:rPr>
-              <a:t>! </a:t>
-            </a:r>
-            <a:endParaRPr kumimoji="1" lang="ko-KR" altLang="en-US" sz="3200" b="1" dirty="0">
-              <a:solidFill>
-                <a:schemeClr val="accent2"/>
-              </a:solidFill>
-            </a:endParaRPr>
-          </a:p>
-        </p:txBody>
-      </p:sp>
-      <p:sp>
-        <p:nvSpPr>
-          <p:cNvPr id="15" name="텍스트 상자 14"/>
-          <p:cNvSpPr txBox="1"/>
-          <p:nvPr/>
-        </p:nvSpPr>
-        <p:spPr>
-          <a:xfrm>
-            <a:off x="1906178" y="5490853"/>
-            <a:ext cx="1903822" cy="461665"/>
-          </a:xfrm>
-          <a:prstGeom prst="rect">
-            <a:avLst/>
-          </a:prstGeom>
-          <a:noFill/>
-        </p:spPr>
-        <p:txBody>
-          <a:bodyPr wrap="square" rtlCol="0">
-            <a:spAutoFit/>
-          </a:bodyPr>
-          <a:lstStyle/>
-          <a:p>
-            <a:r>
-              <a:rPr kumimoji="1" lang="en-US" altLang="ko-KR" sz="2400" b="1" smtClean="0">
-                <a:solidFill>
-                  <a:schemeClr val="bg1"/>
-                </a:solidFill>
-              </a:rPr>
-              <a:t>Remainder</a:t>
-            </a:r>
-            <a:endParaRPr kumimoji="1" lang="ko-KR" altLang="en-US" sz="2400" b="1" dirty="0">
               <a:solidFill>
                 <a:schemeClr val="bg1"/>
               </a:solidFill>
@@ -6198,14 +6375,14 @@
       </p:sp>
       <p:sp>
         <p:nvSpPr>
-          <p:cNvPr id="16" name="텍스트 상자 15"/>
+          <p:cNvPr id="17" name="텍스트 상자 16"/>
           <p:cNvSpPr txBox="1"/>
           <p:nvPr/>
         </p:nvSpPr>
         <p:spPr>
           <a:xfrm>
-            <a:off x="4343400" y="5323761"/>
-            <a:ext cx="1903822" cy="461665"/>
+            <a:off x="6614689" y="4946356"/>
+            <a:ext cx="2557964" cy="584775"/>
           </a:xfrm>
           <a:prstGeom prst="rect">
             <a:avLst/>
@@ -6219,14 +6396,14 @@
           <a:lstStyle/>
           <a:p>
             <a:r>
-              <a:rPr kumimoji="1" lang="en-US" altLang="ko-KR" sz="2400" b="1" smtClean="0">
+              <a:rPr kumimoji="1" lang="en-US" altLang="ko-KR" sz="3200" b="1" dirty="0" smtClean="0">
                 <a:solidFill>
                   <a:schemeClr val="bg1"/>
                 </a:solidFill>
               </a:rPr>
-              <a:t>Average</a:t>
-            </a:r>
-            <a:endParaRPr kumimoji="1" lang="ko-KR" altLang="en-US" sz="2400" b="1" dirty="0">
+              <a:t>Factorial</a:t>
+            </a:r>
+            <a:endParaRPr kumimoji="1" lang="ko-KR" altLang="en-US" sz="3200" b="1" dirty="0">
               <a:solidFill>
                 <a:schemeClr val="bg1"/>
               </a:solidFill>
@@ -6236,14 +6413,14 @@
       </p:sp>
       <p:sp>
         <p:nvSpPr>
-          <p:cNvPr id="17" name="텍스트 상자 16"/>
+          <p:cNvPr id="19" name="텍스트 상자 8"/>
           <p:cNvSpPr txBox="1"/>
           <p:nvPr/>
         </p:nvSpPr>
         <p:spPr>
           <a:xfrm>
-            <a:off x="8697686" y="5260020"/>
-            <a:ext cx="1903822" cy="461665"/>
+            <a:off x="5784858" y="2019116"/>
+            <a:ext cx="3959723" cy="646331"/>
           </a:xfrm>
           <a:prstGeom prst="rect">
             <a:avLst/>
@@ -6257,16 +6434,24 @@
           <a:lstStyle/>
           <a:p>
             <a:r>
-              <a:rPr kumimoji="1" lang="en-US" altLang="ko-KR" sz="2400" b="1" dirty="0" smtClean="0">
-                <a:solidFill>
-                  <a:schemeClr val="bg1"/>
-                </a:solidFill>
-              </a:rPr>
-              <a:t>Factorial</a:t>
-            </a:r>
-            <a:endParaRPr kumimoji="1" lang="ko-KR" altLang="en-US" sz="2400" b="1" dirty="0">
+              <a:rPr kumimoji="1" lang="en-US" altLang="ko-KR" sz="3600" b="1" dirty="0" smtClean="0">
+                <a:solidFill>
+                  <a:schemeClr val="accent2"/>
+                </a:solidFill>
+              </a:rPr>
+              <a:t>NEW </a:t>
+            </a:r>
+            <a:r>
+              <a:rPr kumimoji="1" lang="en-US" altLang="ko-KR" sz="3600" b="1" dirty="0" smtClean="0">
+                <a:solidFill>
+                  <a:schemeClr val="accent2"/>
+                </a:solidFill>
+              </a:rPr>
+              <a:t>Function</a:t>
+            </a:r>
+            <a:endParaRPr kumimoji="1" lang="ko-KR" altLang="en-US" sz="3600" b="1" dirty="0">
               <a:solidFill>
-                <a:schemeClr val="bg1"/>
+                <a:schemeClr val="accent2"/>
               </a:solidFill>
             </a:endParaRPr>
           </a:p>
@@ -6295,6 +6480,14 @@
 <file path=ppt/slides/slide7.xml><?xml version="1.0" encoding="utf-8"?>
 <p:sld xmlns:a="http://schemas.openxmlformats.org/drawingml/2006/main" xmlns:r="http://schemas.openxmlformats.org/officeDocument/2006/relationships" xmlns:p="http://schemas.openxmlformats.org/presentationml/2006/main">
   <p:cSld>
+    <p:bg>
+      <p:bgPr>
+        <a:solidFill>
+          <a:srgbClr val="4C4C4C"/>
+        </a:solidFill>
+        <a:effectLst/>
+      </p:bgPr>
+    </p:bg>
     <p:spTree>
       <p:nvGrpSpPr>
         <p:cNvPr id="1" name=""/>
@@ -6311,56 +6504,6 @@
       </p:grpSpPr>
       <p:sp>
         <p:nvSpPr>
-          <p:cNvPr id="4" name="직사각형 3"/>
-          <p:cNvSpPr/>
-          <p:nvPr/>
-        </p:nvSpPr>
-        <p:spPr>
-          <a:xfrm>
-            <a:off x="0" y="-3"/>
-            <a:ext cx="12192001" cy="6858003"/>
-          </a:xfrm>
-          <a:prstGeom prst="rect">
-            <a:avLst/>
-          </a:prstGeom>
-          <a:solidFill>
-            <a:schemeClr val="tx1">
-              <a:alpha val="70000"/>
-            </a:schemeClr>
-          </a:solidFill>
-          <a:ln>
-            <a:solidFill>
-              <a:schemeClr val="tx1"/>
-            </a:solidFill>
-          </a:ln>
-        </p:spPr>
-        <p:style>
-          <a:lnRef idx="2">
-            <a:schemeClr val="accent1">
-              <a:shade val="50000"/>
-            </a:schemeClr>
-          </a:lnRef>
-          <a:fillRef idx="1">
-            <a:schemeClr val="accent1"/>
-          </a:fillRef>
-          <a:effectRef idx="0">
-            <a:schemeClr val="accent1"/>
-          </a:effectRef>
-          <a:fontRef idx="minor">
-            <a:schemeClr val="lt1"/>
-          </a:fontRef>
-        </p:style>
-        <p:txBody>
-          <a:bodyPr rtlCol="0" anchor="ctr"/>
-          <a:lstStyle/>
-          <a:p>
-            <a:pPr algn="ctr"/>
-            <a:endParaRPr lang="ko-KR" altLang="en-US"/>
-          </a:p>
-        </p:txBody>
-      </p:sp>
-      <p:sp>
-        <p:nvSpPr>
           <p:cNvPr id="5" name="텍스트 상자 4"/>
           <p:cNvSpPr txBox="1"/>
           <p:nvPr/>
@@ -6419,7 +6562,7 @@
         </p:blipFill>
         <p:spPr>
           <a:xfrm>
-            <a:off x="1482815" y="1495593"/>
+            <a:off x="1953257" y="1455190"/>
             <a:ext cx="2880000" cy="4869000"/>
           </a:xfrm>
           <a:prstGeom prst="rect">
@@ -6435,8 +6578,8 @@
         </p:nvSpPr>
         <p:spPr>
           <a:xfrm>
-            <a:off x="5225143" y="2021299"/>
-            <a:ext cx="4114800" cy="584775"/>
+            <a:off x="6720701" y="2617955"/>
+            <a:ext cx="4114800" cy="707886"/>
           </a:xfrm>
           <a:prstGeom prst="rect">
             <a:avLst/>
@@ -6450,14 +6593,14 @@
           <a:lstStyle/>
           <a:p>
             <a:r>
-              <a:rPr kumimoji="1" lang="en-US" altLang="ko-KR" sz="3200" b="1" smtClean="0">
+              <a:rPr kumimoji="1" lang="en-US" altLang="ko-KR" sz="4000" b="1" dirty="0" smtClean="0">
                 <a:solidFill>
                   <a:schemeClr val="accent2"/>
                 </a:solidFill>
               </a:rPr>
               <a:t>Make a Frame</a:t>
             </a:r>
-            <a:endParaRPr kumimoji="1" lang="ko-KR" altLang="en-US" sz="3200" b="1" dirty="0">
+            <a:endParaRPr kumimoji="1" lang="ko-KR" altLang="en-US" sz="4000" b="1" dirty="0">
               <a:solidFill>
                 <a:schemeClr val="accent2"/>
               </a:solidFill>
@@ -6473,8 +6616,8 @@
         </p:nvSpPr>
         <p:spPr>
           <a:xfrm>
-            <a:off x="5823858" y="3668483"/>
-            <a:ext cx="1371600" cy="523220"/>
+            <a:off x="7169513" y="4140673"/>
+            <a:ext cx="2720535" cy="646331"/>
           </a:xfrm>
           <a:prstGeom prst="rect">
             <a:avLst/>
@@ -6488,14 +6631,14 @@
           <a:lstStyle/>
           <a:p>
             <a:r>
-              <a:rPr kumimoji="1" lang="en-US" altLang="ko-KR" sz="2800" b="1" smtClean="0">
+              <a:rPr kumimoji="1" lang="en-US" altLang="ko-KR" sz="3600" b="1" dirty="0" smtClean="0">
                 <a:solidFill>
                   <a:schemeClr val="bg1"/>
                 </a:solidFill>
               </a:rPr>
               <a:t>Button</a:t>
             </a:r>
-            <a:endParaRPr kumimoji="1" lang="ko-KR" altLang="en-US" sz="2800" b="1" dirty="0">
+            <a:endParaRPr kumimoji="1" lang="ko-KR" altLang="en-US" sz="3600" b="1" dirty="0">
               <a:solidFill>
                 <a:schemeClr val="bg1"/>
               </a:solidFill>
@@ -6511,8 +6654,8 @@
         </p:nvSpPr>
         <p:spPr>
           <a:xfrm>
-            <a:off x="5845629" y="2962753"/>
-            <a:ext cx="1371600" cy="523220"/>
+            <a:off x="7169513" y="3494342"/>
+            <a:ext cx="2720535" cy="646331"/>
           </a:xfrm>
           <a:prstGeom prst="rect">
             <a:avLst/>
@@ -6526,14 +6669,14 @@
           <a:lstStyle/>
           <a:p>
             <a:r>
-              <a:rPr kumimoji="1" lang="en-US" altLang="ko-KR" sz="2800" b="1" smtClean="0">
+              <a:rPr kumimoji="1" lang="en-US" altLang="ko-KR" sz="3600" b="1" smtClean="0">
                 <a:solidFill>
                   <a:schemeClr val="bg1"/>
                 </a:solidFill>
               </a:rPr>
               <a:t>Title</a:t>
             </a:r>
-            <a:endParaRPr kumimoji="1" lang="ko-KR" altLang="en-US" sz="2800" b="1" dirty="0">
+            <a:endParaRPr kumimoji="1" lang="ko-KR" altLang="en-US" sz="3600" b="1" dirty="0">
               <a:solidFill>
                 <a:schemeClr val="bg1"/>
               </a:solidFill>
@@ -6564,6 +6707,14 @@
 <file path=ppt/slides/slide8.xml><?xml version="1.0" encoding="utf-8"?>
 <p:sld xmlns:a="http://schemas.openxmlformats.org/drawingml/2006/main" xmlns:r="http://schemas.openxmlformats.org/officeDocument/2006/relationships" xmlns:p="http://schemas.openxmlformats.org/presentationml/2006/main">
   <p:cSld>
+    <p:bg>
+      <p:bgPr>
+        <a:solidFill>
+          <a:srgbClr val="4C4C4C"/>
+        </a:solidFill>
+        <a:effectLst/>
+      </p:bgPr>
+    </p:bg>
     <p:spTree>
       <p:nvGrpSpPr>
         <p:cNvPr id="1" name=""/>
@@ -6580,56 +6731,6 @@
       </p:grpSpPr>
       <p:sp>
         <p:nvSpPr>
-          <p:cNvPr id="4" name="직사각형 3"/>
-          <p:cNvSpPr/>
-          <p:nvPr/>
-        </p:nvSpPr>
-        <p:spPr>
-          <a:xfrm>
-            <a:off x="0" y="-3"/>
-            <a:ext cx="12192001" cy="6858003"/>
-          </a:xfrm>
-          <a:prstGeom prst="rect">
-            <a:avLst/>
-          </a:prstGeom>
-          <a:solidFill>
-            <a:schemeClr val="tx1">
-              <a:alpha val="70000"/>
-            </a:schemeClr>
-          </a:solidFill>
-          <a:ln>
-            <a:solidFill>
-              <a:schemeClr val="tx1"/>
-            </a:solidFill>
-          </a:ln>
-        </p:spPr>
-        <p:style>
-          <a:lnRef idx="2">
-            <a:schemeClr val="accent1">
-              <a:shade val="50000"/>
-            </a:schemeClr>
-          </a:lnRef>
-          <a:fillRef idx="1">
-            <a:schemeClr val="accent1"/>
-          </a:fillRef>
-          <a:effectRef idx="0">
-            <a:schemeClr val="accent1"/>
-          </a:effectRef>
-          <a:fontRef idx="minor">
-            <a:schemeClr val="lt1"/>
-          </a:fontRef>
-        </p:style>
-        <p:txBody>
-          <a:bodyPr rtlCol="0" anchor="ctr"/>
-          <a:lstStyle/>
-          <a:p>
-            <a:pPr algn="ctr"/>
-            <a:endParaRPr lang="ko-KR" altLang="en-US" dirty="0"/>
-          </a:p>
-        </p:txBody>
-      </p:sp>
-      <p:sp>
-        <p:nvSpPr>
           <p:cNvPr id="5" name="텍스트 상자 4"/>
           <p:cNvSpPr txBox="1"/>
           <p:nvPr/>
@@ -6704,8 +6805,8 @@
         </p:nvSpPr>
         <p:spPr>
           <a:xfrm>
-            <a:off x="5225143" y="2021299"/>
-            <a:ext cx="1561371" cy="584775"/>
+            <a:off x="7034908" y="2474429"/>
+            <a:ext cx="1561371" cy="707886"/>
           </a:xfrm>
           <a:prstGeom prst="rect">
             <a:avLst/>
@@ -6719,14 +6820,14 @@
           <a:lstStyle/>
           <a:p>
             <a:r>
-              <a:rPr kumimoji="1" lang="en-US" altLang="ko-KR" sz="3200" b="1" dirty="0" smtClean="0">
+              <a:rPr kumimoji="1" lang="en-US" altLang="ko-KR" sz="4000" b="1" dirty="0" smtClean="0">
                 <a:solidFill>
                   <a:schemeClr val="accent2"/>
                 </a:solidFill>
               </a:rPr>
               <a:t>Add</a:t>
             </a:r>
-            <a:endParaRPr kumimoji="1" lang="ko-KR" altLang="en-US" sz="3200" b="1" dirty="0">
+            <a:endParaRPr kumimoji="1" lang="ko-KR" altLang="en-US" sz="4000" b="1" dirty="0">
               <a:solidFill>
                 <a:schemeClr val="accent2"/>
               </a:solidFill>
@@ -6742,8 +6843,8 @@
         </p:nvSpPr>
         <p:spPr>
           <a:xfrm>
-            <a:off x="5540828" y="2830696"/>
-            <a:ext cx="1850571" cy="523220"/>
+            <a:off x="7259388" y="3226897"/>
+            <a:ext cx="2405743" cy="646331"/>
           </a:xfrm>
           <a:prstGeom prst="rect">
             <a:avLst/>
@@ -6757,14 +6858,14 @@
           <a:lstStyle/>
           <a:p>
             <a:r>
-              <a:rPr kumimoji="1" lang="en-US" altLang="ko-KR" sz="2800" b="1" dirty="0" err="1" smtClean="0">
+              <a:rPr kumimoji="1" lang="en-US" altLang="ko-KR" sz="3600" b="1" dirty="0" smtClean="0">
                 <a:solidFill>
                   <a:schemeClr val="bg1"/>
                 </a:solidFill>
               </a:rPr>
-              <a:t>TextField</a:t>
-            </a:r>
-            <a:endParaRPr kumimoji="1" lang="ko-KR" altLang="en-US" sz="2800" b="1" dirty="0">
+              <a:t>Text Label</a:t>
+            </a:r>
+            <a:endParaRPr kumimoji="1" lang="ko-KR" altLang="en-US" sz="3600" b="1" dirty="0">
               <a:solidFill>
                 <a:schemeClr val="bg1"/>
               </a:solidFill>
@@ -6780,8 +6881,8 @@
         </p:nvSpPr>
         <p:spPr>
           <a:xfrm>
-            <a:off x="5540828" y="3461191"/>
-            <a:ext cx="1371600" cy="523220"/>
+            <a:off x="7259388" y="3845618"/>
+            <a:ext cx="2284038" cy="646331"/>
           </a:xfrm>
           <a:prstGeom prst="rect">
             <a:avLst/>
@@ -6795,14 +6896,14 @@
           <a:lstStyle/>
           <a:p>
             <a:r>
-              <a:rPr kumimoji="1" lang="en-US" altLang="ko-KR" sz="2800" b="1" smtClean="0">
+              <a:rPr kumimoji="1" lang="en-US" altLang="ko-KR" sz="3600" b="1" dirty="0" smtClean="0">
                 <a:solidFill>
                   <a:schemeClr val="bg1"/>
                 </a:solidFill>
               </a:rPr>
               <a:t>Button</a:t>
             </a:r>
-            <a:endParaRPr kumimoji="1" lang="ko-KR" altLang="en-US" sz="2800" b="1" dirty="0">
+            <a:endParaRPr kumimoji="1" lang="ko-KR" altLang="en-US" sz="3600" b="1" dirty="0">
               <a:solidFill>
                 <a:schemeClr val="bg1"/>
               </a:solidFill>
@@ -6818,8 +6919,8 @@
         </p:nvSpPr>
         <p:spPr>
           <a:xfrm>
-            <a:off x="5540827" y="4208817"/>
-            <a:ext cx="2405744" cy="523220"/>
+            <a:off x="7259388" y="4491949"/>
+            <a:ext cx="3063527" cy="646331"/>
           </a:xfrm>
           <a:prstGeom prst="rect">
             <a:avLst/>
@@ -6833,14 +6934,14 @@
           <a:lstStyle/>
           <a:p>
             <a:r>
-              <a:rPr kumimoji="1" lang="en-US" altLang="ko-KR" sz="2800" b="1" smtClean="0">
+              <a:rPr kumimoji="1" lang="en-US" altLang="ko-KR" sz="3600" b="1" dirty="0" smtClean="0">
                 <a:solidFill>
                   <a:schemeClr val="bg1"/>
                 </a:solidFill>
               </a:rPr>
               <a:t>Set Location</a:t>
             </a:r>
-            <a:endParaRPr kumimoji="1" lang="ko-KR" altLang="en-US" sz="2800" b="1" dirty="0">
+            <a:endParaRPr kumimoji="1" lang="ko-KR" altLang="en-US" sz="3600" b="1" dirty="0">
               <a:solidFill>
                 <a:schemeClr val="bg1"/>
               </a:solidFill>
@@ -6871,6 +6972,14 @@
 <file path=ppt/slides/slide9.xml><?xml version="1.0" encoding="utf-8"?>
 <p:sld xmlns:a="http://schemas.openxmlformats.org/drawingml/2006/main" xmlns:r="http://schemas.openxmlformats.org/officeDocument/2006/relationships" xmlns:p="http://schemas.openxmlformats.org/presentationml/2006/main">
   <p:cSld>
+    <p:bg>
+      <p:bgPr>
+        <a:solidFill>
+          <a:srgbClr val="4C4C4C"/>
+        </a:solidFill>
+        <a:effectLst/>
+      </p:bgPr>
+    </p:bg>
     <p:spTree>
       <p:nvGrpSpPr>
         <p:cNvPr id="1" name=""/>
@@ -6887,56 +6996,6 @@
       </p:grpSpPr>
       <p:sp>
         <p:nvSpPr>
-          <p:cNvPr id="4" name="직사각형 3"/>
-          <p:cNvSpPr/>
-          <p:nvPr/>
-        </p:nvSpPr>
-        <p:spPr>
-          <a:xfrm>
-            <a:off x="0" y="-3"/>
-            <a:ext cx="12192001" cy="6858003"/>
-          </a:xfrm>
-          <a:prstGeom prst="rect">
-            <a:avLst/>
-          </a:prstGeom>
-          <a:solidFill>
-            <a:schemeClr val="tx1">
-              <a:alpha val="70000"/>
-            </a:schemeClr>
-          </a:solidFill>
-          <a:ln>
-            <a:solidFill>
-              <a:schemeClr val="tx1"/>
-            </a:solidFill>
-          </a:ln>
-        </p:spPr>
-        <p:style>
-          <a:lnRef idx="2">
-            <a:schemeClr val="accent1">
-              <a:shade val="50000"/>
-            </a:schemeClr>
-          </a:lnRef>
-          <a:fillRef idx="1">
-            <a:schemeClr val="accent1"/>
-          </a:fillRef>
-          <a:effectRef idx="0">
-            <a:schemeClr val="accent1"/>
-          </a:effectRef>
-          <a:fontRef idx="minor">
-            <a:schemeClr val="lt1"/>
-          </a:fontRef>
-        </p:style>
-        <p:txBody>
-          <a:bodyPr rtlCol="0" anchor="ctr"/>
-          <a:lstStyle/>
-          <a:p>
-            <a:pPr algn="ctr"/>
-            <a:endParaRPr lang="ko-KR" altLang="en-US" dirty="0"/>
-          </a:p>
-        </p:txBody>
-      </p:sp>
-      <p:sp>
-        <p:nvSpPr>
           <p:cNvPr id="5" name="텍스트 상자 4"/>
           <p:cNvSpPr txBox="1"/>
           <p:nvPr/>
@@ -6968,82 +7027,6 @@
             <a:endParaRPr kumimoji="1" lang="ko-KR" altLang="en-US" sz="4400" b="1" dirty="0">
               <a:solidFill>
                 <a:schemeClr val="accent2"/>
-              </a:solidFill>
-            </a:endParaRPr>
-          </a:p>
-        </p:txBody>
-      </p:sp>
-      <p:sp>
-        <p:nvSpPr>
-          <p:cNvPr id="7" name="텍스트 상자 6"/>
-          <p:cNvSpPr txBox="1"/>
-          <p:nvPr/>
-        </p:nvSpPr>
-        <p:spPr>
-          <a:xfrm>
-            <a:off x="5225143" y="2021299"/>
-            <a:ext cx="1240971" cy="584775"/>
-          </a:xfrm>
-          <a:prstGeom prst="rect">
-            <a:avLst/>
-          </a:prstGeom>
-          <a:noFill/>
-        </p:spPr>
-        <p:txBody>
-          <a:bodyPr wrap="square" rtlCol="0">
-            <a:spAutoFit/>
-          </a:bodyPr>
-          <a:lstStyle/>
-          <a:p>
-            <a:r>
-              <a:rPr kumimoji="1" lang="en-US" altLang="ko-KR" sz="3200" b="1" dirty="0" smtClean="0">
-                <a:solidFill>
-                  <a:schemeClr val="accent2"/>
-                </a:solidFill>
-              </a:rPr>
-              <a:t>Add</a:t>
-            </a:r>
-            <a:endParaRPr kumimoji="1" lang="ko-KR" altLang="en-US" sz="3200" b="1" dirty="0">
-              <a:solidFill>
-                <a:schemeClr val="accent2"/>
-              </a:solidFill>
-            </a:endParaRPr>
-          </a:p>
-        </p:txBody>
-      </p:sp>
-      <p:sp>
-        <p:nvSpPr>
-          <p:cNvPr id="8" name="텍스트 상자 7"/>
-          <p:cNvSpPr txBox="1"/>
-          <p:nvPr/>
-        </p:nvSpPr>
-        <p:spPr>
-          <a:xfrm>
-            <a:off x="5407842" y="2830696"/>
-            <a:ext cx="1850571" cy="954107"/>
-          </a:xfrm>
-          <a:prstGeom prst="rect">
-            <a:avLst/>
-          </a:prstGeom>
-          <a:noFill/>
-        </p:spPr>
-        <p:txBody>
-          <a:bodyPr wrap="square" rtlCol="0">
-            <a:spAutoFit/>
-          </a:bodyPr>
-          <a:lstStyle/>
-          <a:p>
-            <a:r>
-              <a:rPr kumimoji="1" lang="en-US" altLang="ko-KR" sz="2800" b="1" dirty="0" smtClean="0">
-                <a:solidFill>
-                  <a:schemeClr val="bg1"/>
-                </a:solidFill>
-              </a:rPr>
-              <a:t>Input Function</a:t>
-            </a:r>
-            <a:endParaRPr kumimoji="1" lang="ko-KR" altLang="en-US" sz="2800" b="1" dirty="0">
-              <a:solidFill>
-                <a:schemeClr val="bg1"/>
               </a:solidFill>
             </a:endParaRPr>
           </a:p>
@@ -7071,7 +7054,7 @@
         </p:blipFill>
         <p:spPr>
           <a:xfrm>
-            <a:off x="1295397" y="1739442"/>
+            <a:off x="1729702" y="1769423"/>
             <a:ext cx="2880000" cy="4489938"/>
           </a:xfrm>
           <a:prstGeom prst="rect">
@@ -7081,14 +7064,14 @@
       </p:pic>
       <p:sp>
         <p:nvSpPr>
-          <p:cNvPr id="12" name="텍스트 상자 11"/>
+          <p:cNvPr id="9" name="텍스트 상자 7"/>
           <p:cNvSpPr txBox="1"/>
           <p:nvPr/>
         </p:nvSpPr>
         <p:spPr>
           <a:xfrm>
-            <a:off x="8294914" y="2032184"/>
-            <a:ext cx="2122715" cy="584775"/>
+            <a:off x="6668125" y="2333079"/>
+            <a:ext cx="1561371" cy="707886"/>
           </a:xfrm>
           <a:prstGeom prst="rect">
             <a:avLst/>
@@ -7102,14 +7085,14 @@
           <a:lstStyle/>
           <a:p>
             <a:r>
-              <a:rPr kumimoji="1" lang="en-US" altLang="ko-KR" sz="3200" b="1" smtClean="0">
+              <a:rPr kumimoji="1" lang="en-US" altLang="ko-KR" sz="4000" b="1" dirty="0" smtClean="0">
                 <a:solidFill>
                   <a:schemeClr val="accent2"/>
                 </a:solidFill>
               </a:rPr>
-              <a:t>Delete</a:t>
-            </a:r>
-            <a:endParaRPr kumimoji="1" lang="ko-KR" altLang="en-US" sz="3200" b="1" dirty="0">
+              <a:t>Add</a:t>
+            </a:r>
+            <a:endParaRPr kumimoji="1" lang="ko-KR" altLang="en-US" sz="4000" b="1" dirty="0">
               <a:solidFill>
                 <a:schemeClr val="accent2"/>
               </a:solidFill>
@@ -7119,14 +7102,14 @@
       </p:sp>
       <p:sp>
         <p:nvSpPr>
-          <p:cNvPr id="13" name="텍스트 상자 12"/>
+          <p:cNvPr id="10" name="텍스트 상자 8"/>
           <p:cNvSpPr txBox="1"/>
           <p:nvPr/>
         </p:nvSpPr>
         <p:spPr>
           <a:xfrm>
-            <a:off x="8420099" y="2830696"/>
-            <a:ext cx="1888671" cy="523220"/>
+            <a:off x="7119400" y="3040965"/>
+            <a:ext cx="3528226" cy="646331"/>
           </a:xfrm>
           <a:prstGeom prst="rect">
             <a:avLst/>
@@ -7140,14 +7123,90 @@
           <a:lstStyle/>
           <a:p>
             <a:r>
-              <a:rPr kumimoji="1" lang="en-US" altLang="ko-KR" sz="2800" b="1" dirty="0" err="1" smtClean="0">
+              <a:rPr kumimoji="1" lang="en-US" altLang="ko-KR" sz="3600" b="1" dirty="0" smtClean="0">
                 <a:solidFill>
                   <a:schemeClr val="bg1"/>
                 </a:solidFill>
               </a:rPr>
-              <a:t>TextField</a:t>
-            </a:r>
-            <a:endParaRPr kumimoji="1" lang="ko-KR" altLang="en-US" sz="2800" b="1" dirty="0">
+              <a:t>Input function</a:t>
+            </a:r>
+            <a:endParaRPr kumimoji="1" lang="ko-KR" altLang="en-US" sz="3600" b="1" dirty="0">
+              <a:solidFill>
+                <a:schemeClr val="bg1"/>
+              </a:solidFill>
+            </a:endParaRPr>
+          </a:p>
+        </p:txBody>
+      </p:sp>
+      <p:sp>
+        <p:nvSpPr>
+          <p:cNvPr id="16" name="텍스트 상자 7"/>
+          <p:cNvSpPr txBox="1"/>
+          <p:nvPr/>
+        </p:nvSpPr>
+        <p:spPr>
+          <a:xfrm>
+            <a:off x="6668125" y="4120243"/>
+            <a:ext cx="1879308" cy="707886"/>
+          </a:xfrm>
+          <a:prstGeom prst="rect">
+            <a:avLst/>
+          </a:prstGeom>
+          <a:noFill/>
+        </p:spPr>
+        <p:txBody>
+          <a:bodyPr wrap="square" rtlCol="0">
+            <a:spAutoFit/>
+          </a:bodyPr>
+          <a:lstStyle/>
+          <a:p>
+            <a:r>
+              <a:rPr kumimoji="1" lang="en-US" altLang="ko-KR" sz="4000" b="1" dirty="0" smtClean="0">
+                <a:solidFill>
+                  <a:schemeClr val="accent2"/>
+                </a:solidFill>
+              </a:rPr>
+              <a:t>Delete</a:t>
+            </a:r>
+            <a:endParaRPr kumimoji="1" lang="ko-KR" altLang="en-US" sz="4000" b="1" dirty="0">
+              <a:solidFill>
+                <a:schemeClr val="accent2"/>
+              </a:solidFill>
+            </a:endParaRPr>
+          </a:p>
+        </p:txBody>
+      </p:sp>
+      <p:sp>
+        <p:nvSpPr>
+          <p:cNvPr id="17" name="텍스트 상자 8"/>
+          <p:cNvSpPr txBox="1"/>
+          <p:nvPr/>
+        </p:nvSpPr>
+        <p:spPr>
+          <a:xfrm>
+            <a:off x="7119400" y="4828129"/>
+            <a:ext cx="3528226" cy="646331"/>
+          </a:xfrm>
+          <a:prstGeom prst="rect">
+            <a:avLst/>
+          </a:prstGeom>
+          <a:noFill/>
+        </p:spPr>
+        <p:txBody>
+          <a:bodyPr wrap="square" rtlCol="0">
+            <a:spAutoFit/>
+          </a:bodyPr>
+          <a:lstStyle/>
+          <a:p>
+            <a:r>
+              <a:rPr kumimoji="1" lang="en-US" altLang="ko-KR" sz="3600" b="1" dirty="0" smtClean="0">
+                <a:solidFill>
+                  <a:schemeClr val="bg1"/>
+                </a:solidFill>
+              </a:rPr>
+              <a:t>Text field</a:t>
+            </a:r>
+            <a:endParaRPr kumimoji="1" lang="ko-KR" altLang="en-US" sz="3600" b="1" dirty="0">
               <a:solidFill>
                 <a:schemeClr val="bg1"/>
               </a:solidFill>

</xml_diff>